<commit_message>
a second update to the presentation
</commit_message>
<xml_diff>
--- a/presentations/BWT presentation.pptx
+++ b/presentations/BWT presentation.pptx
@@ -29,17 +29,16 @@
     <p:sldId id="274" r:id="rId24"/>
     <p:sldId id="275" r:id="rId25"/>
     <p:sldId id="276" r:id="rId26"/>
-    <p:sldId id="277" r:id="rId27"/>
   </p:sldIdLst>
   <p:sldSz cy="5143500" cx="9144000"/>
   <p:notesSz cx="6858000" cy="9144000"/>
   <p:embeddedFontLst>
     <p:embeddedFont>
       <p:font typeface="Nunito"/>
-      <p:regular r:id="rId28"/>
-      <p:bold r:id="rId29"/>
-      <p:italic r:id="rId30"/>
-      <p:boldItalic r:id="rId31"/>
+      <p:regular r:id="rId27"/>
+      <p:bold r:id="rId28"/>
+      <p:italic r:id="rId29"/>
+      <p:boldItalic r:id="rId30"/>
     </p:embeddedFont>
   </p:embeddedFontLst>
   <p:defaultTextStyle>
@@ -2058,105 +2057,6 @@
       <p:sp>
         <p:nvSpPr>
           <p:cNvPr id="315" name="Google Shape;315;gdfb17ee910_0_152:notes"/>
-          <p:cNvSpPr txBox="1"/>
-          <p:nvPr>
-            <p:ph idx="1" type="body"/>
-          </p:nvPr>
-        </p:nvSpPr>
-        <p:spPr>
-          <a:xfrm>
-            <a:off x="685800" y="4343400"/>
-            <a:ext cx="5486400" cy="4114800"/>
-          </a:xfrm>
-          <a:prstGeom prst="rect">
-            <a:avLst/>
-          </a:prstGeom>
-        </p:spPr>
-        <p:txBody>
-          <a:bodyPr anchorCtr="0" anchor="t" bIns="91425" lIns="91425" spcFirstLastPara="1" rIns="91425" wrap="square" tIns="91425">
-            <a:noAutofit/>
-          </a:bodyPr>
-          <a:lstStyle/>
-          <a:p>
-            <a:pPr indent="0" lvl="0" marL="0" rtl="0" algn="l">
-              <a:spcBef>
-                <a:spcPts val="0"/>
-              </a:spcBef>
-              <a:spcAft>
-                <a:spcPts val="0"/>
-              </a:spcAft>
-              <a:buNone/>
-            </a:pPr>
-            <a:r>
-              <a:t/>
-            </a:r>
-            <a:endParaRPr/>
-          </a:p>
-        </p:txBody>
-      </p:sp>
-    </p:spTree>
-  </p:cSld>
-  <p:clrMapOvr>
-    <a:masterClrMapping/>
-  </p:clrMapOvr>
-</p:notes>
-</file>
-
-<file path=ppt/notesSlides/notesSlide22.xml><?xml version="1.0" encoding="utf-8"?>
-<p:notes xmlns:a="http://schemas.openxmlformats.org/drawingml/2006/main" xmlns:r="http://schemas.openxmlformats.org/officeDocument/2006/relationships" xmlns:mc="http://schemas.openxmlformats.org/markup-compatibility/2006" xmlns:mv="urn:schemas-microsoft-com:mac:vml" xmlns:p="http://schemas.openxmlformats.org/presentationml/2006/main" xmlns:c="http://schemas.openxmlformats.org/drawingml/2006/chart" xmlns:dgm="http://schemas.openxmlformats.org/drawingml/2006/diagram" xmlns:o="urn:schemas-microsoft-com:office:office" xmlns:v="urn:schemas-microsoft-com:vml" xmlns:pvml="urn:schemas-microsoft-com:office:powerpoint" xmlns:com="http://schemas.openxmlformats.org/drawingml/2006/compatibility" xmlns:p14="http://schemas.microsoft.com/office/powerpoint/2010/main" xmlns:p15="http://schemas.microsoft.com/office/powerpoint/2012/main" xmlns:ahyp="http://schemas.microsoft.com/office/drawing/2018/hyperlinkcolor" showMasterPhAnim="0" showMasterSp="0">
-  <p:cSld>
-    <p:spTree>
-      <p:nvGrpSpPr>
-        <p:cNvPr id="319" name="Shape 319"/>
-        <p:cNvGrpSpPr/>
-        <p:nvPr/>
-      </p:nvGrpSpPr>
-      <p:grpSpPr>
-        <a:xfrm>
-          <a:off x="0" y="0"/>
-          <a:ext cx="0" cy="0"/>
-          <a:chOff x="0" y="0"/>
-          <a:chExt cx="0" cy="0"/>
-        </a:xfrm>
-      </p:grpSpPr>
-      <p:sp>
-        <p:nvSpPr>
-          <p:cNvPr id="320" name="Google Shape;320;gdfb17ee910_0_148:notes"/>
-          <p:cNvSpPr/>
-          <p:nvPr>
-            <p:ph idx="2" type="sldImg"/>
-          </p:nvPr>
-        </p:nvSpPr>
-        <p:spPr>
-          <a:xfrm>
-            <a:off x="381300" y="685800"/>
-            <a:ext cx="6096000" cy="3429000"/>
-          </a:xfrm>
-          <a:custGeom>
-            <a:rect b="b" l="l" r="r" t="t"/>
-            <a:pathLst>
-              <a:path extrusionOk="0" h="120000" w="120000">
-                <a:moveTo>
-                  <a:pt x="0" y="0"/>
-                </a:moveTo>
-                <a:lnTo>
-                  <a:pt x="120000" y="0"/>
-                </a:lnTo>
-                <a:lnTo>
-                  <a:pt x="120000" y="120000"/>
-                </a:lnTo>
-                <a:lnTo>
-                  <a:pt x="0" y="120000"/>
-                </a:lnTo>
-                <a:close/>
-              </a:path>
-            </a:pathLst>
-          </a:custGeom>
-        </p:spPr>
-      </p:sp>
-      <p:sp>
-        <p:nvSpPr>
-          <p:cNvPr id="321" name="Google Shape;321;gdfb17ee910_0_148:notes"/>
           <p:cNvSpPr txBox="1"/>
           <p:nvPr>
             <p:ph idx="1" type="body"/>
@@ -14335,71 +14235,6 @@
 </p:sld>
 </file>
 
-<file path=ppt/slides/slide22.xml><?xml version="1.0" encoding="utf-8"?>
-<p:sld xmlns:a="http://schemas.openxmlformats.org/drawingml/2006/main" xmlns:r="http://schemas.openxmlformats.org/officeDocument/2006/relationships" xmlns:mc="http://schemas.openxmlformats.org/markup-compatibility/2006" xmlns:mv="urn:schemas-microsoft-com:mac:vml" xmlns:p="http://schemas.openxmlformats.org/presentationml/2006/main" xmlns:c="http://schemas.openxmlformats.org/drawingml/2006/chart" xmlns:dgm="http://schemas.openxmlformats.org/drawingml/2006/diagram" xmlns:o="urn:schemas-microsoft-com:office:office" xmlns:v="urn:schemas-microsoft-com:vml" xmlns:pvml="urn:schemas-microsoft-com:office:powerpoint" xmlns:com="http://schemas.openxmlformats.org/drawingml/2006/compatibility" xmlns:p14="http://schemas.microsoft.com/office/powerpoint/2010/main" xmlns:p15="http://schemas.microsoft.com/office/powerpoint/2012/main" xmlns:ahyp="http://schemas.microsoft.com/office/drawing/2018/hyperlinkcolor">
-  <p:cSld>
-    <p:spTree>
-      <p:nvGrpSpPr>
-        <p:cNvPr id="322" name="Shape 322"/>
-        <p:cNvGrpSpPr/>
-        <p:nvPr/>
-      </p:nvGrpSpPr>
-      <p:grpSpPr>
-        <a:xfrm>
-          <a:off x="0" y="0"/>
-          <a:ext cx="0" cy="0"/>
-          <a:chOff x="0" y="0"/>
-          <a:chExt cx="0" cy="0"/>
-        </a:xfrm>
-      </p:grpSpPr>
-      <p:sp>
-        <p:nvSpPr>
-          <p:cNvPr id="323" name="Google Shape;323;p34"/>
-          <p:cNvSpPr txBox="1"/>
-          <p:nvPr>
-            <p:ph type="title"/>
-          </p:nvPr>
-        </p:nvSpPr>
-        <p:spPr>
-          <a:xfrm>
-            <a:off x="1655250" y="2018250"/>
-            <a:ext cx="5833500" cy="954600"/>
-          </a:xfrm>
-          <a:prstGeom prst="rect">
-            <a:avLst/>
-          </a:prstGeom>
-        </p:spPr>
-        <p:txBody>
-          <a:bodyPr anchorCtr="0" anchor="t" bIns="91425" lIns="91425" spcFirstLastPara="1" rIns="91425" wrap="square" tIns="91425">
-            <a:normAutofit fontScale="90000"/>
-          </a:bodyPr>
-          <a:lstStyle/>
-          <a:p>
-            <a:pPr indent="0" lvl="0" marL="0" rtl="0" algn="ctr">
-              <a:spcBef>
-                <a:spcPts val="0"/>
-              </a:spcBef>
-              <a:spcAft>
-                <a:spcPts val="0"/>
-              </a:spcAft>
-              <a:buNone/>
-            </a:pPr>
-            <a:r>
-              <a:rPr lang="en" sz="4300"/>
-              <a:t>Thank you for your attention </a:t>
-            </a:r>
-            <a:endParaRPr sz="4300"/>
-          </a:p>
-        </p:txBody>
-      </p:sp>
-    </p:spTree>
-  </p:cSld>
-  <p:clrMapOvr>
-    <a:masterClrMapping/>
-  </p:clrMapOvr>
-</p:sld>
-</file>
-
 <file path=ppt/slides/slide3.xml><?xml version="1.0" encoding="utf-8"?>
 <p:sld xmlns:a="http://schemas.openxmlformats.org/drawingml/2006/main" xmlns:r="http://schemas.openxmlformats.org/officeDocument/2006/relationships" xmlns:mc="http://schemas.openxmlformats.org/markup-compatibility/2006" xmlns:mv="urn:schemas-microsoft-com:mac:vml" xmlns:p="http://schemas.openxmlformats.org/presentationml/2006/main" xmlns:c="http://schemas.openxmlformats.org/drawingml/2006/chart" xmlns:dgm="http://schemas.openxmlformats.org/drawingml/2006/diagram" xmlns:o="urn:schemas-microsoft-com:office:office" xmlns:v="urn:schemas-microsoft-com:vml" xmlns:pvml="urn:schemas-microsoft-com:office:powerpoint" xmlns:com="http://schemas.openxmlformats.org/drawingml/2006/compatibility" xmlns:p14="http://schemas.microsoft.com/office/powerpoint/2010/main" xmlns:p15="http://schemas.microsoft.com/office/powerpoint/2012/main" xmlns:ahyp="http://schemas.microsoft.com/office/drawing/2018/hyperlinkcolor">
   <p:cSld>
@@ -18034,6 +17869,285 @@
 </file>
 
 <file path=ppt/theme/theme1.xml><?xml version="1.0" encoding="utf-8"?>
+<a:theme xmlns:a="http://schemas.openxmlformats.org/drawingml/2006/main" xmlns:r="http://schemas.openxmlformats.org/officeDocument/2006/relationships" name="Shift">
+  <a:themeElements>
+    <a:clrScheme name="Shift">
+      <a:dk1>
+        <a:srgbClr val="FFFFFF"/>
+      </a:dk1>
+      <a:lt1>
+        <a:srgbClr val="AF7B51"/>
+      </a:lt1>
+      <a:dk2>
+        <a:srgbClr val="233A44"/>
+      </a:dk2>
+      <a:lt2>
+        <a:srgbClr val="D9D9D9"/>
+      </a:lt2>
+      <a:accent1>
+        <a:srgbClr val="00796B"/>
+      </a:accent1>
+      <a:accent2>
+        <a:srgbClr val="D9563F"/>
+      </a:accent2>
+      <a:accent3>
+        <a:srgbClr val="C4A15A"/>
+      </a:accent3>
+      <a:accent4>
+        <a:srgbClr val="14F597"/>
+      </a:accent4>
+      <a:accent5>
+        <a:srgbClr val="3D4594"/>
+      </a:accent5>
+      <a:accent6>
+        <a:srgbClr val="163EF5"/>
+      </a:accent6>
+      <a:hlink>
+        <a:srgbClr val="3D4594"/>
+      </a:hlink>
+      <a:folHlink>
+        <a:srgbClr val="3D4594"/>
+      </a:folHlink>
+    </a:clrScheme>
+    <a:fontScheme name="Office">
+      <a:majorFont>
+        <a:latin typeface="Arial"/>
+        <a:ea typeface=""/>
+        <a:cs typeface=""/>
+        <a:font script="Jpan" typeface="ＭＳ Ｐゴシック"/>
+        <a:font script="Hang" typeface="맑은 고딕"/>
+        <a:font script="Hans" typeface="宋体"/>
+        <a:font script="Hant" typeface="新細明體"/>
+        <a:font script="Arab" typeface="Times New Roman"/>
+        <a:font script="Hebr" typeface="Times New Roman"/>
+        <a:font script="Thai" typeface="Angsana New"/>
+        <a:font script="Ethi" typeface="Nyala"/>
+        <a:font script="Beng" typeface="Vrinda"/>
+        <a:font script="Gujr" typeface="Shruti"/>
+        <a:font script="Khmr" typeface="MoolBoran"/>
+        <a:font script="Knda" typeface="Tunga"/>
+        <a:font script="Guru" typeface="Raavi"/>
+        <a:font script="Cans" typeface="Euphemia"/>
+        <a:font script="Cher" typeface="Plantagenet Cherokee"/>
+        <a:font script="Yiii" typeface="Microsoft Yi Baiti"/>
+        <a:font script="Tibt" typeface="Microsoft Himalaya"/>
+        <a:font script="Thaa" typeface="MV Boli"/>
+        <a:font script="Deva" typeface="Mangal"/>
+        <a:font script="Telu" typeface="Gautami"/>
+        <a:font script="Taml" typeface="Latha"/>
+        <a:font script="Syrc" typeface="Estrangelo Edessa"/>
+        <a:font script="Orya" typeface="Kalinga"/>
+        <a:font script="Mlym" typeface="Kartika"/>
+        <a:font script="Laoo" typeface="DokChampa"/>
+        <a:font script="Sinh" typeface="Iskoola Pota"/>
+        <a:font script="Mong" typeface="Mongolian Baiti"/>
+        <a:font script="Viet" typeface="Times New Roman"/>
+        <a:font script="Uigh" typeface="Microsoft Uighur"/>
+        <a:font script="Geor" typeface="Sylfaen"/>
+      </a:majorFont>
+      <a:minorFont>
+        <a:latin typeface="Arial"/>
+        <a:ea typeface=""/>
+        <a:cs typeface=""/>
+        <a:font script="Jpan" typeface="ＭＳ Ｐゴシック"/>
+        <a:font script="Hang" typeface="맑은 고딕"/>
+        <a:font script="Hans" typeface="宋体"/>
+        <a:font script="Hant" typeface="新細明體"/>
+        <a:font script="Arab" typeface="Arial"/>
+        <a:font script="Hebr" typeface="Arial"/>
+        <a:font script="Thai" typeface="Cordia New"/>
+        <a:font script="Ethi" typeface="Nyala"/>
+        <a:font script="Beng" typeface="Vrinda"/>
+        <a:font script="Gujr" typeface="Shruti"/>
+        <a:font script="Khmr" typeface="DaunPenh"/>
+        <a:font script="Knda" typeface="Tunga"/>
+        <a:font script="Guru" typeface="Raavi"/>
+        <a:font script="Cans" typeface="Euphemia"/>
+        <a:font script="Cher" typeface="Plantagenet Cherokee"/>
+        <a:font script="Yiii" typeface="Microsoft Yi Baiti"/>
+        <a:font script="Tibt" typeface="Microsoft Himalaya"/>
+        <a:font script="Thaa" typeface="MV Boli"/>
+        <a:font script="Deva" typeface="Mangal"/>
+        <a:font script="Telu" typeface="Gautami"/>
+        <a:font script="Taml" typeface="Latha"/>
+        <a:font script="Syrc" typeface="Estrangelo Edessa"/>
+        <a:font script="Orya" typeface="Kalinga"/>
+        <a:font script="Mlym" typeface="Kartika"/>
+        <a:font script="Laoo" typeface="DokChampa"/>
+        <a:font script="Sinh" typeface="Iskoola Pota"/>
+        <a:font script="Mong" typeface="Mongolian Baiti"/>
+        <a:font script="Viet" typeface="Arial"/>
+        <a:font script="Uigh" typeface="Microsoft Uighur"/>
+        <a:font script="Geor" typeface="Sylfaen"/>
+      </a:minorFont>
+    </a:fontScheme>
+    <a:fmtScheme name="Office">
+      <a:fillStyleLst>
+        <a:solidFill>
+          <a:schemeClr val="phClr"/>
+        </a:solidFill>
+        <a:gradFill rotWithShape="1">
+          <a:gsLst>
+            <a:gs pos="0">
+              <a:schemeClr val="phClr">
+                <a:tint val="50000"/>
+                <a:satMod val="300000"/>
+              </a:schemeClr>
+            </a:gs>
+            <a:gs pos="35000">
+              <a:schemeClr val="phClr">
+                <a:tint val="37000"/>
+                <a:satMod val="300000"/>
+              </a:schemeClr>
+            </a:gs>
+            <a:gs pos="100000">
+              <a:schemeClr val="phClr">
+                <a:tint val="15000"/>
+                <a:satMod val="350000"/>
+              </a:schemeClr>
+            </a:gs>
+          </a:gsLst>
+          <a:lin ang="16200000" scaled="1"/>
+        </a:gradFill>
+        <a:gradFill rotWithShape="1">
+          <a:gsLst>
+            <a:gs pos="0">
+              <a:schemeClr val="phClr">
+                <a:tint val="100000"/>
+                <a:shade val="100000"/>
+                <a:satMod val="130000"/>
+              </a:schemeClr>
+            </a:gs>
+            <a:gs pos="100000">
+              <a:schemeClr val="phClr">
+                <a:tint val="50000"/>
+                <a:shade val="100000"/>
+                <a:satMod val="350000"/>
+              </a:schemeClr>
+            </a:gs>
+          </a:gsLst>
+          <a:lin ang="16200000" scaled="0"/>
+        </a:gradFill>
+      </a:fillStyleLst>
+      <a:lnStyleLst>
+        <a:ln w="9525" cap="flat" cmpd="sng" algn="ctr">
+          <a:solidFill>
+            <a:schemeClr val="phClr">
+              <a:shade val="95000"/>
+              <a:satMod val="105000"/>
+            </a:schemeClr>
+          </a:solidFill>
+          <a:prstDash val="solid"/>
+        </a:ln>
+        <a:ln w="25400" cap="flat" cmpd="sng" algn="ctr">
+          <a:solidFill>
+            <a:schemeClr val="phClr"/>
+          </a:solidFill>
+          <a:prstDash val="solid"/>
+        </a:ln>
+        <a:ln w="38100" cap="flat" cmpd="sng" algn="ctr">
+          <a:solidFill>
+            <a:schemeClr val="phClr"/>
+          </a:solidFill>
+          <a:prstDash val="solid"/>
+        </a:ln>
+      </a:lnStyleLst>
+      <a:effectStyleLst>
+        <a:effectStyle>
+          <a:effectLst>
+            <a:outerShdw blurRad="40000" dist="20000" dir="5400000" rotWithShape="0">
+              <a:srgbClr val="000000">
+                <a:alpha val="38000"/>
+              </a:srgbClr>
+            </a:outerShdw>
+          </a:effectLst>
+        </a:effectStyle>
+        <a:effectStyle>
+          <a:effectLst>
+            <a:outerShdw blurRad="40000" dist="23000" dir="5400000" rotWithShape="0">
+              <a:srgbClr val="000000">
+                <a:alpha val="35000"/>
+              </a:srgbClr>
+            </a:outerShdw>
+          </a:effectLst>
+        </a:effectStyle>
+        <a:effectStyle>
+          <a:effectLst>
+            <a:outerShdw blurRad="40000" dist="23000" dir="5400000" rotWithShape="0">
+              <a:srgbClr val="000000">
+                <a:alpha val="35000"/>
+              </a:srgbClr>
+            </a:outerShdw>
+          </a:effectLst>
+          <a:scene3d>
+            <a:camera prst="orthographicFront">
+              <a:rot lat="0" lon="0" rev="0"/>
+            </a:camera>
+            <a:lightRig rig="threePt" dir="t">
+              <a:rot lat="0" lon="0" rev="1200000"/>
+            </a:lightRig>
+          </a:scene3d>
+          <a:sp3d>
+            <a:bevelT w="63500" h="25400"/>
+          </a:sp3d>
+        </a:effectStyle>
+      </a:effectStyleLst>
+      <a:bgFillStyleLst>
+        <a:solidFill>
+          <a:schemeClr val="phClr"/>
+        </a:solidFill>
+        <a:gradFill rotWithShape="1">
+          <a:gsLst>
+            <a:gs pos="0">
+              <a:schemeClr val="phClr">
+                <a:tint val="40000"/>
+                <a:satMod val="350000"/>
+              </a:schemeClr>
+            </a:gs>
+            <a:gs pos="40000">
+              <a:schemeClr val="phClr">
+                <a:tint val="45000"/>
+                <a:shade val="99000"/>
+                <a:satMod val="350000"/>
+              </a:schemeClr>
+            </a:gs>
+            <a:gs pos="100000">
+              <a:schemeClr val="phClr">
+                <a:shade val="20000"/>
+                <a:satMod val="255000"/>
+              </a:schemeClr>
+            </a:gs>
+          </a:gsLst>
+          <a:path path="circle">
+            <a:fillToRect l="50000" t="-80000" r="50000" b="180000"/>
+          </a:path>
+        </a:gradFill>
+        <a:gradFill rotWithShape="1">
+          <a:gsLst>
+            <a:gs pos="0">
+              <a:schemeClr val="phClr">
+                <a:tint val="80000"/>
+                <a:satMod val="300000"/>
+              </a:schemeClr>
+            </a:gs>
+            <a:gs pos="100000">
+              <a:schemeClr val="phClr">
+                <a:shade val="30000"/>
+                <a:satMod val="200000"/>
+              </a:schemeClr>
+            </a:gs>
+          </a:gsLst>
+          <a:path path="circle">
+            <a:fillToRect l="50000" t="50000" r="50000" b="50000"/>
+          </a:path>
+        </a:gradFill>
+      </a:bgFillStyleLst>
+    </a:fmtScheme>
+  </a:themeElements>
+</a:theme>
+</file>
+
+<file path=ppt/theme/theme2.xml><?xml version="1.0" encoding="utf-8"?>
 <a:theme xmlns:a="http://schemas.openxmlformats.org/drawingml/2006/main" xmlns:r="http://schemas.openxmlformats.org/officeDocument/2006/relationships">
   <a:themeElements>
     <a:clrScheme name="Default">
@@ -18310,283 +18424,4 @@
     </a:fmtScheme>
   </a:themeElements>
 </a:theme>
-</file>
-
-<file path=ppt/theme/theme2.xml><?xml version="1.0" encoding="utf-8"?>
-<a:theme xmlns:a="http://schemas.openxmlformats.org/drawingml/2006/main" xmlns:r="http://schemas.openxmlformats.org/officeDocument/2006/relationships" name="Shift">
-  <a:themeElements>
-    <a:clrScheme name="Shift">
-      <a:dk1>
-        <a:srgbClr val="FFFFFF"/>
-      </a:dk1>
-      <a:lt1>
-        <a:srgbClr val="AF7B51"/>
-      </a:lt1>
-      <a:dk2>
-        <a:srgbClr val="233A44"/>
-      </a:dk2>
-      <a:lt2>
-        <a:srgbClr val="D9D9D9"/>
-      </a:lt2>
-      <a:accent1>
-        <a:srgbClr val="00796B"/>
-      </a:accent1>
-      <a:accent2>
-        <a:srgbClr val="D9563F"/>
-      </a:accent2>
-      <a:accent3>
-        <a:srgbClr val="C4A15A"/>
-      </a:accent3>
-      <a:accent4>
-        <a:srgbClr val="14F597"/>
-      </a:accent4>
-      <a:accent5>
-        <a:srgbClr val="3D4594"/>
-      </a:accent5>
-      <a:accent6>
-        <a:srgbClr val="163EF5"/>
-      </a:accent6>
-      <a:hlink>
-        <a:srgbClr val="3D4594"/>
-      </a:hlink>
-      <a:folHlink>
-        <a:srgbClr val="3D4594"/>
-      </a:folHlink>
-    </a:clrScheme>
-    <a:fontScheme name="Office">
-      <a:majorFont>
-        <a:latin typeface="Arial"/>
-        <a:ea typeface=""/>
-        <a:cs typeface=""/>
-        <a:font script="Jpan" typeface="ＭＳ Ｐゴシック"/>
-        <a:font script="Hang" typeface="맑은 고딕"/>
-        <a:font script="Hans" typeface="宋体"/>
-        <a:font script="Hant" typeface="新細明體"/>
-        <a:font script="Arab" typeface="Times New Roman"/>
-        <a:font script="Hebr" typeface="Times New Roman"/>
-        <a:font script="Thai" typeface="Angsana New"/>
-        <a:font script="Ethi" typeface="Nyala"/>
-        <a:font script="Beng" typeface="Vrinda"/>
-        <a:font script="Gujr" typeface="Shruti"/>
-        <a:font script="Khmr" typeface="MoolBoran"/>
-        <a:font script="Knda" typeface="Tunga"/>
-        <a:font script="Guru" typeface="Raavi"/>
-        <a:font script="Cans" typeface="Euphemia"/>
-        <a:font script="Cher" typeface="Plantagenet Cherokee"/>
-        <a:font script="Yiii" typeface="Microsoft Yi Baiti"/>
-        <a:font script="Tibt" typeface="Microsoft Himalaya"/>
-        <a:font script="Thaa" typeface="MV Boli"/>
-        <a:font script="Deva" typeface="Mangal"/>
-        <a:font script="Telu" typeface="Gautami"/>
-        <a:font script="Taml" typeface="Latha"/>
-        <a:font script="Syrc" typeface="Estrangelo Edessa"/>
-        <a:font script="Orya" typeface="Kalinga"/>
-        <a:font script="Mlym" typeface="Kartika"/>
-        <a:font script="Laoo" typeface="DokChampa"/>
-        <a:font script="Sinh" typeface="Iskoola Pota"/>
-        <a:font script="Mong" typeface="Mongolian Baiti"/>
-        <a:font script="Viet" typeface="Times New Roman"/>
-        <a:font script="Uigh" typeface="Microsoft Uighur"/>
-        <a:font script="Geor" typeface="Sylfaen"/>
-      </a:majorFont>
-      <a:minorFont>
-        <a:latin typeface="Arial"/>
-        <a:ea typeface=""/>
-        <a:cs typeface=""/>
-        <a:font script="Jpan" typeface="ＭＳ Ｐゴシック"/>
-        <a:font script="Hang" typeface="맑은 고딕"/>
-        <a:font script="Hans" typeface="宋体"/>
-        <a:font script="Hant" typeface="新細明體"/>
-        <a:font script="Arab" typeface="Arial"/>
-        <a:font script="Hebr" typeface="Arial"/>
-        <a:font script="Thai" typeface="Cordia New"/>
-        <a:font script="Ethi" typeface="Nyala"/>
-        <a:font script="Beng" typeface="Vrinda"/>
-        <a:font script="Gujr" typeface="Shruti"/>
-        <a:font script="Khmr" typeface="DaunPenh"/>
-        <a:font script="Knda" typeface="Tunga"/>
-        <a:font script="Guru" typeface="Raavi"/>
-        <a:font script="Cans" typeface="Euphemia"/>
-        <a:font script="Cher" typeface="Plantagenet Cherokee"/>
-        <a:font script="Yiii" typeface="Microsoft Yi Baiti"/>
-        <a:font script="Tibt" typeface="Microsoft Himalaya"/>
-        <a:font script="Thaa" typeface="MV Boli"/>
-        <a:font script="Deva" typeface="Mangal"/>
-        <a:font script="Telu" typeface="Gautami"/>
-        <a:font script="Taml" typeface="Latha"/>
-        <a:font script="Syrc" typeface="Estrangelo Edessa"/>
-        <a:font script="Orya" typeface="Kalinga"/>
-        <a:font script="Mlym" typeface="Kartika"/>
-        <a:font script="Laoo" typeface="DokChampa"/>
-        <a:font script="Sinh" typeface="Iskoola Pota"/>
-        <a:font script="Mong" typeface="Mongolian Baiti"/>
-        <a:font script="Viet" typeface="Arial"/>
-        <a:font script="Uigh" typeface="Microsoft Uighur"/>
-        <a:font script="Geor" typeface="Sylfaen"/>
-      </a:minorFont>
-    </a:fontScheme>
-    <a:fmtScheme name="Office">
-      <a:fillStyleLst>
-        <a:solidFill>
-          <a:schemeClr val="phClr"/>
-        </a:solidFill>
-        <a:gradFill rotWithShape="1">
-          <a:gsLst>
-            <a:gs pos="0">
-              <a:schemeClr val="phClr">
-                <a:tint val="50000"/>
-                <a:satMod val="300000"/>
-              </a:schemeClr>
-            </a:gs>
-            <a:gs pos="35000">
-              <a:schemeClr val="phClr">
-                <a:tint val="37000"/>
-                <a:satMod val="300000"/>
-              </a:schemeClr>
-            </a:gs>
-            <a:gs pos="100000">
-              <a:schemeClr val="phClr">
-                <a:tint val="15000"/>
-                <a:satMod val="350000"/>
-              </a:schemeClr>
-            </a:gs>
-          </a:gsLst>
-          <a:lin ang="16200000" scaled="1"/>
-        </a:gradFill>
-        <a:gradFill rotWithShape="1">
-          <a:gsLst>
-            <a:gs pos="0">
-              <a:schemeClr val="phClr">
-                <a:tint val="100000"/>
-                <a:shade val="100000"/>
-                <a:satMod val="130000"/>
-              </a:schemeClr>
-            </a:gs>
-            <a:gs pos="100000">
-              <a:schemeClr val="phClr">
-                <a:tint val="50000"/>
-                <a:shade val="100000"/>
-                <a:satMod val="350000"/>
-              </a:schemeClr>
-            </a:gs>
-          </a:gsLst>
-          <a:lin ang="16200000" scaled="0"/>
-        </a:gradFill>
-      </a:fillStyleLst>
-      <a:lnStyleLst>
-        <a:ln w="9525" cap="flat" cmpd="sng" algn="ctr">
-          <a:solidFill>
-            <a:schemeClr val="phClr">
-              <a:shade val="95000"/>
-              <a:satMod val="105000"/>
-            </a:schemeClr>
-          </a:solidFill>
-          <a:prstDash val="solid"/>
-        </a:ln>
-        <a:ln w="25400" cap="flat" cmpd="sng" algn="ctr">
-          <a:solidFill>
-            <a:schemeClr val="phClr"/>
-          </a:solidFill>
-          <a:prstDash val="solid"/>
-        </a:ln>
-        <a:ln w="38100" cap="flat" cmpd="sng" algn="ctr">
-          <a:solidFill>
-            <a:schemeClr val="phClr"/>
-          </a:solidFill>
-          <a:prstDash val="solid"/>
-        </a:ln>
-      </a:lnStyleLst>
-      <a:effectStyleLst>
-        <a:effectStyle>
-          <a:effectLst>
-            <a:outerShdw blurRad="40000" dist="20000" dir="5400000" rotWithShape="0">
-              <a:srgbClr val="000000">
-                <a:alpha val="38000"/>
-              </a:srgbClr>
-            </a:outerShdw>
-          </a:effectLst>
-        </a:effectStyle>
-        <a:effectStyle>
-          <a:effectLst>
-            <a:outerShdw blurRad="40000" dist="23000" dir="5400000" rotWithShape="0">
-              <a:srgbClr val="000000">
-                <a:alpha val="35000"/>
-              </a:srgbClr>
-            </a:outerShdw>
-          </a:effectLst>
-        </a:effectStyle>
-        <a:effectStyle>
-          <a:effectLst>
-            <a:outerShdw blurRad="40000" dist="23000" dir="5400000" rotWithShape="0">
-              <a:srgbClr val="000000">
-                <a:alpha val="35000"/>
-              </a:srgbClr>
-            </a:outerShdw>
-          </a:effectLst>
-          <a:scene3d>
-            <a:camera prst="orthographicFront">
-              <a:rot lat="0" lon="0" rev="0"/>
-            </a:camera>
-            <a:lightRig rig="threePt" dir="t">
-              <a:rot lat="0" lon="0" rev="1200000"/>
-            </a:lightRig>
-          </a:scene3d>
-          <a:sp3d>
-            <a:bevelT w="63500" h="25400"/>
-          </a:sp3d>
-        </a:effectStyle>
-      </a:effectStyleLst>
-      <a:bgFillStyleLst>
-        <a:solidFill>
-          <a:schemeClr val="phClr"/>
-        </a:solidFill>
-        <a:gradFill rotWithShape="1">
-          <a:gsLst>
-            <a:gs pos="0">
-              <a:schemeClr val="phClr">
-                <a:tint val="40000"/>
-                <a:satMod val="350000"/>
-              </a:schemeClr>
-            </a:gs>
-            <a:gs pos="40000">
-              <a:schemeClr val="phClr">
-                <a:tint val="45000"/>
-                <a:shade val="99000"/>
-                <a:satMod val="350000"/>
-              </a:schemeClr>
-            </a:gs>
-            <a:gs pos="100000">
-              <a:schemeClr val="phClr">
-                <a:shade val="20000"/>
-                <a:satMod val="255000"/>
-              </a:schemeClr>
-            </a:gs>
-          </a:gsLst>
-          <a:path path="circle">
-            <a:fillToRect l="50000" t="-80000" r="50000" b="180000"/>
-          </a:path>
-        </a:gradFill>
-        <a:gradFill rotWithShape="1">
-          <a:gsLst>
-            <a:gs pos="0">
-              <a:schemeClr val="phClr">
-                <a:tint val="80000"/>
-                <a:satMod val="300000"/>
-              </a:schemeClr>
-            </a:gs>
-            <a:gs pos="100000">
-              <a:schemeClr val="phClr">
-                <a:shade val="30000"/>
-                <a:satMod val="200000"/>
-              </a:schemeClr>
-            </a:gs>
-          </a:gsLst>
-          <a:path path="circle">
-            <a:fillToRect l="50000" t="50000" r="50000" b="50000"/>
-          </a:path>
-        </a:gradFill>
-      </a:bgFillStyleLst>
-    </a:fmtScheme>
-  </a:themeElements>
-</a:theme>
 </file>
</xml_diff>

<commit_message>
updated graphs to scatter plot
</commit_message>
<xml_diff>
--- a/presentations/BWT presentation.pptx
+++ b/presentations/BWT presentation.pptx
@@ -29,16 +29,22 @@
     <p:sldId id="274" r:id="rId24"/>
     <p:sldId id="275" r:id="rId25"/>
     <p:sldId id="276" r:id="rId26"/>
+    <p:sldId id="277" r:id="rId27"/>
+    <p:sldId id="278" r:id="rId28"/>
+    <p:sldId id="279" r:id="rId29"/>
+    <p:sldId id="280" r:id="rId30"/>
+    <p:sldId id="281" r:id="rId31"/>
+    <p:sldId id="282" r:id="rId32"/>
   </p:sldIdLst>
   <p:sldSz cy="5143500" cx="9144000"/>
   <p:notesSz cx="6858000" cy="9144000"/>
   <p:embeddedFontLst>
     <p:embeddedFont>
       <p:font typeface="Nunito"/>
-      <p:regular r:id="rId27"/>
-      <p:bold r:id="rId28"/>
-      <p:italic r:id="rId29"/>
-      <p:boldItalic r:id="rId30"/>
+      <p:regular r:id="rId33"/>
+      <p:bold r:id="rId34"/>
+      <p:italic r:id="rId35"/>
+      <p:boldItalic r:id="rId36"/>
     </p:embeddedFont>
   </p:embeddedFontLst>
   <p:defaultTextStyle>
@@ -1427,7 +1433,7 @@
       </p:grpSpPr>
       <p:sp>
         <p:nvSpPr>
-          <p:cNvPr id="285" name="Google Shape;285;gdfb17ee910_5_0:notes"/>
+          <p:cNvPr id="285" name="Google Shape;285;ge060f73493_0_12:notes"/>
           <p:cNvSpPr/>
           <p:nvPr>
             <p:ph idx="2" type="sldImg"/>
@@ -1462,7 +1468,7 @@
       </p:sp>
       <p:sp>
         <p:nvSpPr>
-          <p:cNvPr id="286" name="Google Shape;286;gdfb17ee910_5_0:notes"/>
+          <p:cNvPr id="286" name="Google Shape;286;ge060f73493_0_12:notes"/>
           <p:cNvSpPr txBox="1"/>
           <p:nvPr>
             <p:ph idx="1" type="body"/>
@@ -1526,7 +1532,7 @@
       </p:grpSpPr>
       <p:sp>
         <p:nvSpPr>
-          <p:cNvPr id="290" name="Google Shape;290;gdfb17ee910_5_31:notes"/>
+          <p:cNvPr id="290" name="Google Shape;290;ge060f73493_0_18:notes"/>
           <p:cNvSpPr/>
           <p:nvPr>
             <p:ph idx="2" type="sldImg"/>
@@ -1561,7 +1567,7 @@
       </p:sp>
       <p:sp>
         <p:nvSpPr>
-          <p:cNvPr id="291" name="Google Shape;291;gdfb17ee910_5_31:notes"/>
+          <p:cNvPr id="291" name="Google Shape;291;ge060f73493_0_18:notes"/>
           <p:cNvSpPr txBox="1"/>
           <p:nvPr>
             <p:ph idx="1" type="body"/>
@@ -1611,7 +1617,7 @@
   <p:cSld>
     <p:spTree>
       <p:nvGrpSpPr>
-        <p:cNvPr id="296" name="Shape 296"/>
+        <p:cNvPr id="294" name="Shape 294"/>
         <p:cNvGrpSpPr/>
         <p:nvPr/>
       </p:nvGrpSpPr>
@@ -1625,7 +1631,7 @@
       </p:grpSpPr>
       <p:sp>
         <p:nvSpPr>
-          <p:cNvPr id="297" name="Google Shape;297;gdfb17ee910_5_7:notes"/>
+          <p:cNvPr id="295" name="Google Shape;295;gdfb17ee910_5_0:notes"/>
           <p:cNvSpPr/>
           <p:nvPr>
             <p:ph idx="2" type="sldImg"/>
@@ -1660,7 +1666,7 @@
       </p:sp>
       <p:sp>
         <p:nvSpPr>
-          <p:cNvPr id="298" name="Google Shape;298;gdfb17ee910_5_7:notes"/>
+          <p:cNvPr id="296" name="Google Shape;296;gdfb17ee910_5_0:notes"/>
           <p:cNvSpPr txBox="1"/>
           <p:nvPr>
             <p:ph idx="1" type="body"/>
@@ -1710,7 +1716,7 @@
   <p:cSld>
     <p:spTree>
       <p:nvGrpSpPr>
-        <p:cNvPr id="301" name="Shape 301"/>
+        <p:cNvPr id="299" name="Shape 299"/>
         <p:cNvGrpSpPr/>
         <p:nvPr/>
       </p:nvGrpSpPr>
@@ -1724,7 +1730,7 @@
       </p:grpSpPr>
       <p:sp>
         <p:nvSpPr>
-          <p:cNvPr id="302" name="Google Shape;302;gdfb17ee910_5_37:notes"/>
+          <p:cNvPr id="300" name="Google Shape;300;gdfb17ee910_5_31:notes"/>
           <p:cNvSpPr/>
           <p:nvPr>
             <p:ph idx="2" type="sldImg"/>
@@ -1759,7 +1765,7 @@
       </p:sp>
       <p:sp>
         <p:nvSpPr>
-          <p:cNvPr id="303" name="Google Shape;303;gdfb17ee910_5_37:notes"/>
+          <p:cNvPr id="301" name="Google Shape;301;gdfb17ee910_5_31:notes"/>
           <p:cNvSpPr txBox="1"/>
           <p:nvPr>
             <p:ph idx="1" type="body"/>
@@ -1908,7 +1914,7 @@
   <p:cSld>
     <p:spTree>
       <p:nvGrpSpPr>
-        <p:cNvPr id="308" name="Shape 308"/>
+        <p:cNvPr id="306" name="Shape 306"/>
         <p:cNvGrpSpPr/>
         <p:nvPr/>
       </p:nvGrpSpPr>
@@ -1922,7 +1928,7 @@
       </p:grpSpPr>
       <p:sp>
         <p:nvSpPr>
-          <p:cNvPr id="309" name="Google Shape;309;gdfb17ee910_5_13:notes"/>
+          <p:cNvPr id="307" name="Google Shape;307;ge060f73493_0_29:notes"/>
           <p:cNvSpPr/>
           <p:nvPr>
             <p:ph idx="2" type="sldImg"/>
@@ -1957,7 +1963,7 @@
       </p:sp>
       <p:sp>
         <p:nvSpPr>
-          <p:cNvPr id="310" name="Google Shape;310;gdfb17ee910_5_13:notes"/>
+          <p:cNvPr id="308" name="Google Shape;308;ge060f73493_0_29:notes"/>
           <p:cNvSpPr txBox="1"/>
           <p:nvPr>
             <p:ph idx="1" type="body"/>
@@ -2007,7 +2013,7 @@
   <p:cSld>
     <p:spTree>
       <p:nvGrpSpPr>
-        <p:cNvPr id="313" name="Shape 313"/>
+        <p:cNvPr id="311" name="Shape 311"/>
         <p:cNvGrpSpPr/>
         <p:nvPr/>
       </p:nvGrpSpPr>
@@ -2021,7 +2027,7 @@
       </p:grpSpPr>
       <p:sp>
         <p:nvSpPr>
-          <p:cNvPr id="314" name="Google Shape;314;gdfb17ee910_0_152:notes"/>
+          <p:cNvPr id="312" name="Google Shape;312;ge060f73493_0_35:notes"/>
           <p:cNvSpPr/>
           <p:nvPr>
             <p:ph idx="2" type="sldImg"/>
@@ -2056,7 +2062,601 @@
       </p:sp>
       <p:sp>
         <p:nvSpPr>
-          <p:cNvPr id="315" name="Google Shape;315;gdfb17ee910_0_152:notes"/>
+          <p:cNvPr id="313" name="Google Shape;313;ge060f73493_0_35:notes"/>
+          <p:cNvSpPr txBox="1"/>
+          <p:nvPr>
+            <p:ph idx="1" type="body"/>
+          </p:nvPr>
+        </p:nvSpPr>
+        <p:spPr>
+          <a:xfrm>
+            <a:off x="685800" y="4343400"/>
+            <a:ext cx="5486400" cy="4114800"/>
+          </a:xfrm>
+          <a:prstGeom prst="rect">
+            <a:avLst/>
+          </a:prstGeom>
+        </p:spPr>
+        <p:txBody>
+          <a:bodyPr anchorCtr="0" anchor="t" bIns="91425" lIns="91425" spcFirstLastPara="1" rIns="91425" wrap="square" tIns="91425">
+            <a:noAutofit/>
+          </a:bodyPr>
+          <a:lstStyle/>
+          <a:p>
+            <a:pPr indent="0" lvl="0" marL="0" rtl="0" algn="l">
+              <a:spcBef>
+                <a:spcPts val="0"/>
+              </a:spcBef>
+              <a:spcAft>
+                <a:spcPts val="0"/>
+              </a:spcAft>
+              <a:buNone/>
+            </a:pPr>
+            <a:r>
+              <a:t/>
+            </a:r>
+            <a:endParaRPr/>
+          </a:p>
+        </p:txBody>
+      </p:sp>
+    </p:spTree>
+  </p:cSld>
+  <p:clrMapOvr>
+    <a:masterClrMapping/>
+  </p:clrMapOvr>
+</p:notes>
+</file>
+
+<file path=ppt/notesSlides/notesSlide22.xml><?xml version="1.0" encoding="utf-8"?>
+<p:notes xmlns:a="http://schemas.openxmlformats.org/drawingml/2006/main" xmlns:r="http://schemas.openxmlformats.org/officeDocument/2006/relationships" xmlns:mc="http://schemas.openxmlformats.org/markup-compatibility/2006" xmlns:mv="urn:schemas-microsoft-com:mac:vml" xmlns:p="http://schemas.openxmlformats.org/presentationml/2006/main" xmlns:c="http://schemas.openxmlformats.org/drawingml/2006/chart" xmlns:dgm="http://schemas.openxmlformats.org/drawingml/2006/diagram" xmlns:o="urn:schemas-microsoft-com:office:office" xmlns:v="urn:schemas-microsoft-com:vml" xmlns:pvml="urn:schemas-microsoft-com:office:powerpoint" xmlns:com="http://schemas.openxmlformats.org/drawingml/2006/compatibility" xmlns:p14="http://schemas.microsoft.com/office/powerpoint/2010/main" xmlns:p15="http://schemas.microsoft.com/office/powerpoint/2012/main" xmlns:ahyp="http://schemas.microsoft.com/office/drawing/2018/hyperlinkcolor" showMasterPhAnim="0" showMasterSp="0">
+  <p:cSld>
+    <p:spTree>
+      <p:nvGrpSpPr>
+        <p:cNvPr id="316" name="Shape 316"/>
+        <p:cNvGrpSpPr/>
+        <p:nvPr/>
+      </p:nvGrpSpPr>
+      <p:grpSpPr>
+        <a:xfrm>
+          <a:off x="0" y="0"/>
+          <a:ext cx="0" cy="0"/>
+          <a:chOff x="0" y="0"/>
+          <a:chExt cx="0" cy="0"/>
+        </a:xfrm>
+      </p:grpSpPr>
+      <p:sp>
+        <p:nvSpPr>
+          <p:cNvPr id="317" name="Google Shape;317;gdfb17ee910_5_7:notes"/>
+          <p:cNvSpPr/>
+          <p:nvPr>
+            <p:ph idx="2" type="sldImg"/>
+          </p:nvPr>
+        </p:nvSpPr>
+        <p:spPr>
+          <a:xfrm>
+            <a:off x="381300" y="685800"/>
+            <a:ext cx="6096000" cy="3429000"/>
+          </a:xfrm>
+          <a:custGeom>
+            <a:rect b="b" l="l" r="r" t="t"/>
+            <a:pathLst>
+              <a:path extrusionOk="0" h="120000" w="120000">
+                <a:moveTo>
+                  <a:pt x="0" y="0"/>
+                </a:moveTo>
+                <a:lnTo>
+                  <a:pt x="120000" y="0"/>
+                </a:lnTo>
+                <a:lnTo>
+                  <a:pt x="120000" y="120000"/>
+                </a:lnTo>
+                <a:lnTo>
+                  <a:pt x="0" y="120000"/>
+                </a:lnTo>
+                <a:close/>
+              </a:path>
+            </a:pathLst>
+          </a:custGeom>
+        </p:spPr>
+      </p:sp>
+      <p:sp>
+        <p:nvSpPr>
+          <p:cNvPr id="318" name="Google Shape;318;gdfb17ee910_5_7:notes"/>
+          <p:cNvSpPr txBox="1"/>
+          <p:nvPr>
+            <p:ph idx="1" type="body"/>
+          </p:nvPr>
+        </p:nvSpPr>
+        <p:spPr>
+          <a:xfrm>
+            <a:off x="685800" y="4343400"/>
+            <a:ext cx="5486400" cy="4114800"/>
+          </a:xfrm>
+          <a:prstGeom prst="rect">
+            <a:avLst/>
+          </a:prstGeom>
+        </p:spPr>
+        <p:txBody>
+          <a:bodyPr anchorCtr="0" anchor="t" bIns="91425" lIns="91425" spcFirstLastPara="1" rIns="91425" wrap="square" tIns="91425">
+            <a:noAutofit/>
+          </a:bodyPr>
+          <a:lstStyle/>
+          <a:p>
+            <a:pPr indent="0" lvl="0" marL="0" rtl="0" algn="l">
+              <a:spcBef>
+                <a:spcPts val="0"/>
+              </a:spcBef>
+              <a:spcAft>
+                <a:spcPts val="0"/>
+              </a:spcAft>
+              <a:buNone/>
+            </a:pPr>
+            <a:r>
+              <a:t/>
+            </a:r>
+            <a:endParaRPr/>
+          </a:p>
+        </p:txBody>
+      </p:sp>
+    </p:spTree>
+  </p:cSld>
+  <p:clrMapOvr>
+    <a:masterClrMapping/>
+  </p:clrMapOvr>
+</p:notes>
+</file>
+
+<file path=ppt/notesSlides/notesSlide23.xml><?xml version="1.0" encoding="utf-8"?>
+<p:notes xmlns:a="http://schemas.openxmlformats.org/drawingml/2006/main" xmlns:r="http://schemas.openxmlformats.org/officeDocument/2006/relationships" xmlns:mc="http://schemas.openxmlformats.org/markup-compatibility/2006" xmlns:mv="urn:schemas-microsoft-com:mac:vml" xmlns:p="http://schemas.openxmlformats.org/presentationml/2006/main" xmlns:c="http://schemas.openxmlformats.org/drawingml/2006/chart" xmlns:dgm="http://schemas.openxmlformats.org/drawingml/2006/diagram" xmlns:o="urn:schemas-microsoft-com:office:office" xmlns:v="urn:schemas-microsoft-com:vml" xmlns:pvml="urn:schemas-microsoft-com:office:powerpoint" xmlns:com="http://schemas.openxmlformats.org/drawingml/2006/compatibility" xmlns:p14="http://schemas.microsoft.com/office/powerpoint/2010/main" xmlns:p15="http://schemas.microsoft.com/office/powerpoint/2012/main" xmlns:ahyp="http://schemas.microsoft.com/office/drawing/2018/hyperlinkcolor" showMasterPhAnim="0" showMasterSp="0">
+  <p:cSld>
+    <p:spTree>
+      <p:nvGrpSpPr>
+        <p:cNvPr id="321" name="Shape 321"/>
+        <p:cNvGrpSpPr/>
+        <p:nvPr/>
+      </p:nvGrpSpPr>
+      <p:grpSpPr>
+        <a:xfrm>
+          <a:off x="0" y="0"/>
+          <a:ext cx="0" cy="0"/>
+          <a:chOff x="0" y="0"/>
+          <a:chExt cx="0" cy="0"/>
+        </a:xfrm>
+      </p:grpSpPr>
+      <p:sp>
+        <p:nvSpPr>
+          <p:cNvPr id="322" name="Google Shape;322;gdfb17ee910_5_37:notes"/>
+          <p:cNvSpPr/>
+          <p:nvPr>
+            <p:ph idx="2" type="sldImg"/>
+          </p:nvPr>
+        </p:nvSpPr>
+        <p:spPr>
+          <a:xfrm>
+            <a:off x="381300" y="685800"/>
+            <a:ext cx="6096000" cy="3429000"/>
+          </a:xfrm>
+          <a:custGeom>
+            <a:rect b="b" l="l" r="r" t="t"/>
+            <a:pathLst>
+              <a:path extrusionOk="0" h="120000" w="120000">
+                <a:moveTo>
+                  <a:pt x="0" y="0"/>
+                </a:moveTo>
+                <a:lnTo>
+                  <a:pt x="120000" y="0"/>
+                </a:lnTo>
+                <a:lnTo>
+                  <a:pt x="120000" y="120000"/>
+                </a:lnTo>
+                <a:lnTo>
+                  <a:pt x="0" y="120000"/>
+                </a:lnTo>
+                <a:close/>
+              </a:path>
+            </a:pathLst>
+          </a:custGeom>
+        </p:spPr>
+      </p:sp>
+      <p:sp>
+        <p:nvSpPr>
+          <p:cNvPr id="323" name="Google Shape;323;gdfb17ee910_5_37:notes"/>
+          <p:cNvSpPr txBox="1"/>
+          <p:nvPr>
+            <p:ph idx="1" type="body"/>
+          </p:nvPr>
+        </p:nvSpPr>
+        <p:spPr>
+          <a:xfrm>
+            <a:off x="685800" y="4343400"/>
+            <a:ext cx="5486400" cy="4114800"/>
+          </a:xfrm>
+          <a:prstGeom prst="rect">
+            <a:avLst/>
+          </a:prstGeom>
+        </p:spPr>
+        <p:txBody>
+          <a:bodyPr anchorCtr="0" anchor="t" bIns="91425" lIns="91425" spcFirstLastPara="1" rIns="91425" wrap="square" tIns="91425">
+            <a:noAutofit/>
+          </a:bodyPr>
+          <a:lstStyle/>
+          <a:p>
+            <a:pPr indent="0" lvl="0" marL="0" rtl="0" algn="l">
+              <a:spcBef>
+                <a:spcPts val="0"/>
+              </a:spcBef>
+              <a:spcAft>
+                <a:spcPts val="0"/>
+              </a:spcAft>
+              <a:buNone/>
+            </a:pPr>
+            <a:r>
+              <a:t/>
+            </a:r>
+            <a:endParaRPr/>
+          </a:p>
+        </p:txBody>
+      </p:sp>
+    </p:spTree>
+  </p:cSld>
+  <p:clrMapOvr>
+    <a:masterClrMapping/>
+  </p:clrMapOvr>
+</p:notes>
+</file>
+
+<file path=ppt/notesSlides/notesSlide24.xml><?xml version="1.0" encoding="utf-8"?>
+<p:notes xmlns:a="http://schemas.openxmlformats.org/drawingml/2006/main" xmlns:r="http://schemas.openxmlformats.org/officeDocument/2006/relationships" xmlns:mc="http://schemas.openxmlformats.org/markup-compatibility/2006" xmlns:mv="urn:schemas-microsoft-com:mac:vml" xmlns:p="http://schemas.openxmlformats.org/presentationml/2006/main" xmlns:c="http://schemas.openxmlformats.org/drawingml/2006/chart" xmlns:dgm="http://schemas.openxmlformats.org/drawingml/2006/diagram" xmlns:o="urn:schemas-microsoft-com:office:office" xmlns:v="urn:schemas-microsoft-com:vml" xmlns:pvml="urn:schemas-microsoft-com:office:powerpoint" xmlns:com="http://schemas.openxmlformats.org/drawingml/2006/compatibility" xmlns:p14="http://schemas.microsoft.com/office/powerpoint/2010/main" xmlns:p15="http://schemas.microsoft.com/office/powerpoint/2012/main" xmlns:ahyp="http://schemas.microsoft.com/office/drawing/2018/hyperlinkcolor" showMasterPhAnim="0" showMasterSp="0">
+  <p:cSld>
+    <p:spTree>
+      <p:nvGrpSpPr>
+        <p:cNvPr id="328" name="Shape 328"/>
+        <p:cNvGrpSpPr/>
+        <p:nvPr/>
+      </p:nvGrpSpPr>
+      <p:grpSpPr>
+        <a:xfrm>
+          <a:off x="0" y="0"/>
+          <a:ext cx="0" cy="0"/>
+          <a:chOff x="0" y="0"/>
+          <a:chExt cx="0" cy="0"/>
+        </a:xfrm>
+      </p:grpSpPr>
+      <p:sp>
+        <p:nvSpPr>
+          <p:cNvPr id="329" name="Google Shape;329;ge060f73493_0_42:notes"/>
+          <p:cNvSpPr/>
+          <p:nvPr>
+            <p:ph idx="2" type="sldImg"/>
+          </p:nvPr>
+        </p:nvSpPr>
+        <p:spPr>
+          <a:xfrm>
+            <a:off x="381300" y="685800"/>
+            <a:ext cx="6096000" cy="3429000"/>
+          </a:xfrm>
+          <a:custGeom>
+            <a:rect b="b" l="l" r="r" t="t"/>
+            <a:pathLst>
+              <a:path extrusionOk="0" h="120000" w="120000">
+                <a:moveTo>
+                  <a:pt x="0" y="0"/>
+                </a:moveTo>
+                <a:lnTo>
+                  <a:pt x="120000" y="0"/>
+                </a:lnTo>
+                <a:lnTo>
+                  <a:pt x="120000" y="120000"/>
+                </a:lnTo>
+                <a:lnTo>
+                  <a:pt x="0" y="120000"/>
+                </a:lnTo>
+                <a:close/>
+              </a:path>
+            </a:pathLst>
+          </a:custGeom>
+        </p:spPr>
+      </p:sp>
+      <p:sp>
+        <p:nvSpPr>
+          <p:cNvPr id="330" name="Google Shape;330;ge060f73493_0_42:notes"/>
+          <p:cNvSpPr txBox="1"/>
+          <p:nvPr>
+            <p:ph idx="1" type="body"/>
+          </p:nvPr>
+        </p:nvSpPr>
+        <p:spPr>
+          <a:xfrm>
+            <a:off x="685800" y="4343400"/>
+            <a:ext cx="5486400" cy="4114800"/>
+          </a:xfrm>
+          <a:prstGeom prst="rect">
+            <a:avLst/>
+          </a:prstGeom>
+        </p:spPr>
+        <p:txBody>
+          <a:bodyPr anchorCtr="0" anchor="t" bIns="91425" lIns="91425" spcFirstLastPara="1" rIns="91425" wrap="square" tIns="91425">
+            <a:noAutofit/>
+          </a:bodyPr>
+          <a:lstStyle/>
+          <a:p>
+            <a:pPr indent="0" lvl="0" marL="0" rtl="0" algn="l">
+              <a:spcBef>
+                <a:spcPts val="0"/>
+              </a:spcBef>
+              <a:spcAft>
+                <a:spcPts val="0"/>
+              </a:spcAft>
+              <a:buNone/>
+            </a:pPr>
+            <a:r>
+              <a:t/>
+            </a:r>
+            <a:endParaRPr/>
+          </a:p>
+        </p:txBody>
+      </p:sp>
+    </p:spTree>
+  </p:cSld>
+  <p:clrMapOvr>
+    <a:masterClrMapping/>
+  </p:clrMapOvr>
+</p:notes>
+</file>
+
+<file path=ppt/notesSlides/notesSlide25.xml><?xml version="1.0" encoding="utf-8"?>
+<p:notes xmlns:a="http://schemas.openxmlformats.org/drawingml/2006/main" xmlns:r="http://schemas.openxmlformats.org/officeDocument/2006/relationships" xmlns:mc="http://schemas.openxmlformats.org/markup-compatibility/2006" xmlns:mv="urn:schemas-microsoft-com:mac:vml" xmlns:p="http://schemas.openxmlformats.org/presentationml/2006/main" xmlns:c="http://schemas.openxmlformats.org/drawingml/2006/chart" xmlns:dgm="http://schemas.openxmlformats.org/drawingml/2006/diagram" xmlns:o="urn:schemas-microsoft-com:office:office" xmlns:v="urn:schemas-microsoft-com:vml" xmlns:pvml="urn:schemas-microsoft-com:office:powerpoint" xmlns:com="http://schemas.openxmlformats.org/drawingml/2006/compatibility" xmlns:p14="http://schemas.microsoft.com/office/powerpoint/2010/main" xmlns:p15="http://schemas.microsoft.com/office/powerpoint/2012/main" xmlns:ahyp="http://schemas.microsoft.com/office/drawing/2018/hyperlinkcolor" showMasterPhAnim="0" showMasterSp="0">
+  <p:cSld>
+    <p:spTree>
+      <p:nvGrpSpPr>
+        <p:cNvPr id="333" name="Shape 333"/>
+        <p:cNvGrpSpPr/>
+        <p:nvPr/>
+      </p:nvGrpSpPr>
+      <p:grpSpPr>
+        <a:xfrm>
+          <a:off x="0" y="0"/>
+          <a:ext cx="0" cy="0"/>
+          <a:chOff x="0" y="0"/>
+          <a:chExt cx="0" cy="0"/>
+        </a:xfrm>
+      </p:grpSpPr>
+      <p:sp>
+        <p:nvSpPr>
+          <p:cNvPr id="334" name="Google Shape;334;ge060f73493_0_48:notes"/>
+          <p:cNvSpPr/>
+          <p:nvPr>
+            <p:ph idx="2" type="sldImg"/>
+          </p:nvPr>
+        </p:nvSpPr>
+        <p:spPr>
+          <a:xfrm>
+            <a:off x="381300" y="685800"/>
+            <a:ext cx="6096000" cy="3429000"/>
+          </a:xfrm>
+          <a:custGeom>
+            <a:rect b="b" l="l" r="r" t="t"/>
+            <a:pathLst>
+              <a:path extrusionOk="0" h="120000" w="120000">
+                <a:moveTo>
+                  <a:pt x="0" y="0"/>
+                </a:moveTo>
+                <a:lnTo>
+                  <a:pt x="120000" y="0"/>
+                </a:lnTo>
+                <a:lnTo>
+                  <a:pt x="120000" y="120000"/>
+                </a:lnTo>
+                <a:lnTo>
+                  <a:pt x="0" y="120000"/>
+                </a:lnTo>
+                <a:close/>
+              </a:path>
+            </a:pathLst>
+          </a:custGeom>
+        </p:spPr>
+      </p:sp>
+      <p:sp>
+        <p:nvSpPr>
+          <p:cNvPr id="335" name="Google Shape;335;ge060f73493_0_48:notes"/>
+          <p:cNvSpPr txBox="1"/>
+          <p:nvPr>
+            <p:ph idx="1" type="body"/>
+          </p:nvPr>
+        </p:nvSpPr>
+        <p:spPr>
+          <a:xfrm>
+            <a:off x="685800" y="4343400"/>
+            <a:ext cx="5486400" cy="4114800"/>
+          </a:xfrm>
+          <a:prstGeom prst="rect">
+            <a:avLst/>
+          </a:prstGeom>
+        </p:spPr>
+        <p:txBody>
+          <a:bodyPr anchorCtr="0" anchor="t" bIns="91425" lIns="91425" spcFirstLastPara="1" rIns="91425" wrap="square" tIns="91425">
+            <a:noAutofit/>
+          </a:bodyPr>
+          <a:lstStyle/>
+          <a:p>
+            <a:pPr indent="0" lvl="0" marL="0" rtl="0" algn="l">
+              <a:spcBef>
+                <a:spcPts val="0"/>
+              </a:spcBef>
+              <a:spcAft>
+                <a:spcPts val="0"/>
+              </a:spcAft>
+              <a:buNone/>
+            </a:pPr>
+            <a:r>
+              <a:t/>
+            </a:r>
+            <a:endParaRPr/>
+          </a:p>
+        </p:txBody>
+      </p:sp>
+    </p:spTree>
+  </p:cSld>
+  <p:clrMapOvr>
+    <a:masterClrMapping/>
+  </p:clrMapOvr>
+</p:notes>
+</file>
+
+<file path=ppt/notesSlides/notesSlide26.xml><?xml version="1.0" encoding="utf-8"?>
+<p:notes xmlns:a="http://schemas.openxmlformats.org/drawingml/2006/main" xmlns:r="http://schemas.openxmlformats.org/officeDocument/2006/relationships" xmlns:mc="http://schemas.openxmlformats.org/markup-compatibility/2006" xmlns:mv="urn:schemas-microsoft-com:mac:vml" xmlns:p="http://schemas.openxmlformats.org/presentationml/2006/main" xmlns:c="http://schemas.openxmlformats.org/drawingml/2006/chart" xmlns:dgm="http://schemas.openxmlformats.org/drawingml/2006/diagram" xmlns:o="urn:schemas-microsoft-com:office:office" xmlns:v="urn:schemas-microsoft-com:vml" xmlns:pvml="urn:schemas-microsoft-com:office:powerpoint" xmlns:com="http://schemas.openxmlformats.org/drawingml/2006/compatibility" xmlns:p14="http://schemas.microsoft.com/office/powerpoint/2010/main" xmlns:p15="http://schemas.microsoft.com/office/powerpoint/2012/main" xmlns:ahyp="http://schemas.microsoft.com/office/drawing/2018/hyperlinkcolor" showMasterPhAnim="0" showMasterSp="0">
+  <p:cSld>
+    <p:spTree>
+      <p:nvGrpSpPr>
+        <p:cNvPr id="338" name="Shape 338"/>
+        <p:cNvGrpSpPr/>
+        <p:nvPr/>
+      </p:nvGrpSpPr>
+      <p:grpSpPr>
+        <a:xfrm>
+          <a:off x="0" y="0"/>
+          <a:ext cx="0" cy="0"/>
+          <a:chOff x="0" y="0"/>
+          <a:chExt cx="0" cy="0"/>
+        </a:xfrm>
+      </p:grpSpPr>
+      <p:sp>
+        <p:nvSpPr>
+          <p:cNvPr id="339" name="Google Shape;339;gdfb17ee910_5_13:notes"/>
+          <p:cNvSpPr/>
+          <p:nvPr>
+            <p:ph idx="2" type="sldImg"/>
+          </p:nvPr>
+        </p:nvSpPr>
+        <p:spPr>
+          <a:xfrm>
+            <a:off x="381300" y="685800"/>
+            <a:ext cx="6096000" cy="3429000"/>
+          </a:xfrm>
+          <a:custGeom>
+            <a:rect b="b" l="l" r="r" t="t"/>
+            <a:pathLst>
+              <a:path extrusionOk="0" h="120000" w="120000">
+                <a:moveTo>
+                  <a:pt x="0" y="0"/>
+                </a:moveTo>
+                <a:lnTo>
+                  <a:pt x="120000" y="0"/>
+                </a:lnTo>
+                <a:lnTo>
+                  <a:pt x="120000" y="120000"/>
+                </a:lnTo>
+                <a:lnTo>
+                  <a:pt x="0" y="120000"/>
+                </a:lnTo>
+                <a:close/>
+              </a:path>
+            </a:pathLst>
+          </a:custGeom>
+        </p:spPr>
+      </p:sp>
+      <p:sp>
+        <p:nvSpPr>
+          <p:cNvPr id="340" name="Google Shape;340;gdfb17ee910_5_13:notes"/>
+          <p:cNvSpPr txBox="1"/>
+          <p:nvPr>
+            <p:ph idx="1" type="body"/>
+          </p:nvPr>
+        </p:nvSpPr>
+        <p:spPr>
+          <a:xfrm>
+            <a:off x="685800" y="4343400"/>
+            <a:ext cx="5486400" cy="4114800"/>
+          </a:xfrm>
+          <a:prstGeom prst="rect">
+            <a:avLst/>
+          </a:prstGeom>
+        </p:spPr>
+        <p:txBody>
+          <a:bodyPr anchorCtr="0" anchor="t" bIns="91425" lIns="91425" spcFirstLastPara="1" rIns="91425" wrap="square" tIns="91425">
+            <a:noAutofit/>
+          </a:bodyPr>
+          <a:lstStyle/>
+          <a:p>
+            <a:pPr indent="0" lvl="0" marL="0" rtl="0" algn="l">
+              <a:spcBef>
+                <a:spcPts val="0"/>
+              </a:spcBef>
+              <a:spcAft>
+                <a:spcPts val="0"/>
+              </a:spcAft>
+              <a:buNone/>
+            </a:pPr>
+            <a:r>
+              <a:t/>
+            </a:r>
+            <a:endParaRPr/>
+          </a:p>
+        </p:txBody>
+      </p:sp>
+    </p:spTree>
+  </p:cSld>
+  <p:clrMapOvr>
+    <a:masterClrMapping/>
+  </p:clrMapOvr>
+</p:notes>
+</file>
+
+<file path=ppt/notesSlides/notesSlide27.xml><?xml version="1.0" encoding="utf-8"?>
+<p:notes xmlns:a="http://schemas.openxmlformats.org/drawingml/2006/main" xmlns:r="http://schemas.openxmlformats.org/officeDocument/2006/relationships" xmlns:mc="http://schemas.openxmlformats.org/markup-compatibility/2006" xmlns:mv="urn:schemas-microsoft-com:mac:vml" xmlns:p="http://schemas.openxmlformats.org/presentationml/2006/main" xmlns:c="http://schemas.openxmlformats.org/drawingml/2006/chart" xmlns:dgm="http://schemas.openxmlformats.org/drawingml/2006/diagram" xmlns:o="urn:schemas-microsoft-com:office:office" xmlns:v="urn:schemas-microsoft-com:vml" xmlns:pvml="urn:schemas-microsoft-com:office:powerpoint" xmlns:com="http://schemas.openxmlformats.org/drawingml/2006/compatibility" xmlns:p14="http://schemas.microsoft.com/office/powerpoint/2010/main" xmlns:p15="http://schemas.microsoft.com/office/powerpoint/2012/main" xmlns:ahyp="http://schemas.microsoft.com/office/drawing/2018/hyperlinkcolor" showMasterPhAnim="0" showMasterSp="0">
+  <p:cSld>
+    <p:spTree>
+      <p:nvGrpSpPr>
+        <p:cNvPr id="343" name="Shape 343"/>
+        <p:cNvGrpSpPr/>
+        <p:nvPr/>
+      </p:nvGrpSpPr>
+      <p:grpSpPr>
+        <a:xfrm>
+          <a:off x="0" y="0"/>
+          <a:ext cx="0" cy="0"/>
+          <a:chOff x="0" y="0"/>
+          <a:chExt cx="0" cy="0"/>
+        </a:xfrm>
+      </p:grpSpPr>
+      <p:sp>
+        <p:nvSpPr>
+          <p:cNvPr id="344" name="Google Shape;344;gdfb17ee910_0_152:notes"/>
+          <p:cNvSpPr/>
+          <p:nvPr>
+            <p:ph idx="2" type="sldImg"/>
+          </p:nvPr>
+        </p:nvSpPr>
+        <p:spPr>
+          <a:xfrm>
+            <a:off x="381300" y="685800"/>
+            <a:ext cx="6096000" cy="3429000"/>
+          </a:xfrm>
+          <a:custGeom>
+            <a:rect b="b" l="l" r="r" t="t"/>
+            <a:pathLst>
+              <a:path extrusionOk="0" h="120000" w="120000">
+                <a:moveTo>
+                  <a:pt x="0" y="0"/>
+                </a:moveTo>
+                <a:lnTo>
+                  <a:pt x="120000" y="0"/>
+                </a:lnTo>
+                <a:lnTo>
+                  <a:pt x="120000" y="120000"/>
+                </a:lnTo>
+                <a:lnTo>
+                  <a:pt x="0" y="120000"/>
+                </a:lnTo>
+                <a:close/>
+              </a:path>
+            </a:pathLst>
+          </a:custGeom>
+        </p:spPr>
+      </p:sp>
+      <p:sp>
+        <p:nvSpPr>
+          <p:cNvPr id="345" name="Google Shape;345;gdfb17ee910_0_152:notes"/>
           <p:cNvSpPr txBox="1"/>
           <p:nvPr>
             <p:ph idx="1" type="body"/>
@@ -13149,8 +13749,8 @@
         </p:blipFill>
         <p:spPr>
           <a:xfrm>
-            <a:off x="204075" y="1243325"/>
-            <a:ext cx="8735850" cy="3695100"/>
+            <a:off x="204075" y="1247825"/>
+            <a:ext cx="8725200" cy="3690601"/>
           </a:xfrm>
           <a:prstGeom prst="rect">
             <a:avLst/>
@@ -13159,6 +13759,14 @@
           <a:ln>
             <a:noFill/>
           </a:ln>
+          <a:effectLst>
+            <a:outerShdw blurRad="57150" rotWithShape="0" algn="bl" dir="5400000" dist="19050">
+              <a:srgbClr val="000000">
+                <a:alpha val="50000"/>
+              </a:srgbClr>
+            </a:outerShdw>
+            <a:reflection blurRad="0" dir="5400000" dist="38100" endA="0" endPos="30000" fadeDir="5400012" kx="0" rotWithShape="0" algn="bl" stPos="0" sy="-100000" ky="0"/>
+          </a:effectLst>
         </p:spPr>
       </p:pic>
       <p:sp>
@@ -13348,8 +13956,8 @@
         </p:blipFill>
         <p:spPr>
           <a:xfrm>
-            <a:off x="444050" y="313025"/>
-            <a:ext cx="8429250" cy="4517450"/>
+            <a:off x="692625" y="202975"/>
+            <a:ext cx="7654149" cy="4732825"/>
           </a:xfrm>
           <a:prstGeom prst="rect">
             <a:avLst/>
@@ -13401,8 +14009,8 @@
         </p:blipFill>
         <p:spPr>
           <a:xfrm>
-            <a:off x="201875" y="1265525"/>
-            <a:ext cx="8740251" cy="3692951"/>
+            <a:off x="692625" y="213625"/>
+            <a:ext cx="7628301" cy="4716825"/>
           </a:xfrm>
           <a:prstGeom prst="rect">
             <a:avLst/>
@@ -13413,140 +14021,6 @@
           </a:ln>
         </p:spPr>
       </p:pic>
-      <p:sp>
-        <p:nvSpPr>
-          <p:cNvPr id="294" name="Google Shape;294;p29"/>
-          <p:cNvSpPr txBox="1"/>
-          <p:nvPr>
-            <p:ph type="title"/>
-          </p:nvPr>
-        </p:nvSpPr>
-        <p:spPr>
-          <a:xfrm>
-            <a:off x="204200" y="208750"/>
-            <a:ext cx="4156800" cy="954600"/>
-          </a:xfrm>
-          <a:prstGeom prst="rect">
-            <a:avLst/>
-          </a:prstGeom>
-        </p:spPr>
-        <p:txBody>
-          <a:bodyPr anchorCtr="0" anchor="t" bIns="91425" lIns="91425" spcFirstLastPara="1" rIns="91425" wrap="square" tIns="91425">
-            <a:normAutofit/>
-          </a:bodyPr>
-          <a:lstStyle/>
-          <a:p>
-            <a:pPr indent="0" lvl="0" marL="0" rtl="0" algn="l">
-              <a:spcBef>
-                <a:spcPts val="0"/>
-              </a:spcBef>
-              <a:spcAft>
-                <a:spcPts val="0"/>
-              </a:spcAft>
-              <a:buNone/>
-            </a:pPr>
-            <a:r>
-              <a:rPr lang="en" sz="2600"/>
-              <a:t>Coffea Arabica search time</a:t>
-            </a:r>
-            <a:endParaRPr sz="2600"/>
-          </a:p>
-        </p:txBody>
-      </p:sp>
-      <p:sp>
-        <p:nvSpPr>
-          <p:cNvPr id="295" name="Google Shape;295;p29"/>
-          <p:cNvSpPr txBox="1"/>
-          <p:nvPr>
-            <p:ph type="title"/>
-          </p:nvPr>
-        </p:nvSpPr>
-        <p:spPr>
-          <a:xfrm>
-            <a:off x="204200" y="675000"/>
-            <a:ext cx="8365800" cy="1101300"/>
-          </a:xfrm>
-          <a:prstGeom prst="rect">
-            <a:avLst/>
-          </a:prstGeom>
-        </p:spPr>
-        <p:txBody>
-          <a:bodyPr anchorCtr="0" anchor="t" bIns="91425" lIns="91425" spcFirstLastPara="1" rIns="91425" wrap="square" tIns="91425">
-            <a:normAutofit/>
-          </a:bodyPr>
-          <a:lstStyle/>
-          <a:p>
-            <a:pPr indent="0" lvl="0" marL="0" rtl="0" algn="l">
-              <a:spcBef>
-                <a:spcPts val="0"/>
-              </a:spcBef>
-              <a:spcAft>
-                <a:spcPts val="0"/>
-              </a:spcAft>
-              <a:buNone/>
-            </a:pPr>
-            <a:r>
-              <a:rPr lang="en" sz="1600"/>
-              <a:t>Non optimized:</a:t>
-            </a:r>
-            <a:br>
-              <a:rPr lang="en" sz="1600"/>
-            </a:br>
-            <a:r>
-              <a:rPr lang="en" sz="1350">
-                <a:solidFill>
-                  <a:srgbClr val="073763"/>
-                </a:solidFill>
-              </a:rPr>
-              <a:t>BWT =</a:t>
-            </a:r>
-            <a:r>
-              <a:rPr lang="en" sz="1350"/>
-              <a:t> 77,292s    </a:t>
-            </a:r>
-            <a:r>
-              <a:rPr lang="en" sz="1350">
-                <a:solidFill>
-                  <a:srgbClr val="073763"/>
-                </a:solidFill>
-              </a:rPr>
-              <a:t>ATGCATG:</a:t>
-            </a:r>
-            <a:r>
-              <a:rPr lang="en" sz="1350"/>
-              <a:t> 3,251ms (6529)  </a:t>
-            </a:r>
-            <a:r>
-              <a:rPr lang="en" sz="1350">
-                <a:solidFill>
-                  <a:srgbClr val="073763"/>
-                </a:solidFill>
-              </a:rPr>
-              <a:t>TCTCTCTA:</a:t>
-            </a:r>
-            <a:r>
-              <a:rPr lang="en" sz="1350"/>
-              <a:t> 0,643ms (1262)  </a:t>
-            </a:r>
-            <a:r>
-              <a:rPr lang="en" sz="1350">
-                <a:solidFill>
-                  <a:srgbClr val="073763"/>
-                </a:solidFill>
-              </a:rPr>
-              <a:t>TTCACTACTCTCA:</a:t>
-            </a:r>
-            <a:r>
-              <a:rPr lang="en" sz="1350"/>
-              <a:t> ~0ms (0)</a:t>
-            </a:r>
-            <a:br>
-              <a:rPr lang="en" sz="1600"/>
-            </a:br>
-            <a:endParaRPr sz="1600"/>
-          </a:p>
-        </p:txBody>
-      </p:sp>
     </p:spTree>
   </p:cSld>
   <p:clrMapOvr>
@@ -13560,7 +14034,7 @@
   <p:cSld>
     <p:spTree>
       <p:nvGrpSpPr>
-        <p:cNvPr id="299" name="Shape 299"/>
+        <p:cNvPr id="297" name="Shape 297"/>
         <p:cNvGrpSpPr/>
         <p:nvPr/>
       </p:nvGrpSpPr>
@@ -13574,7 +14048,7 @@
       </p:grpSpPr>
       <p:pic>
         <p:nvPicPr>
-          <p:cNvPr id="300" name="Google Shape;300;p30" title="Points scored"/>
+          <p:cNvPr id="298" name="Google Shape;298;p30" title="Points scored"/>
           <p:cNvPicPr preferRelativeResize="0"/>
           <p:nvPr/>
         </p:nvPicPr>
@@ -13588,8 +14062,8 @@
         </p:blipFill>
         <p:spPr>
           <a:xfrm>
-            <a:off x="192425" y="199825"/>
-            <a:ext cx="8755050" cy="4743851"/>
+            <a:off x="444050" y="313025"/>
+            <a:ext cx="8429250" cy="4517450"/>
           </a:xfrm>
           <a:prstGeom prst="rect">
             <a:avLst/>
@@ -13598,9 +14072,6 @@
           <a:ln>
             <a:noFill/>
           </a:ln>
-          <a:effectLst>
-            <a:reflection blurRad="0" dir="5400000" dist="38100" endA="0" endPos="30000" fadeDir="5400012" kx="0" rotWithShape="0" algn="bl" stPos="0" sy="-100000" ky="0"/>
-          </a:effectLst>
         </p:spPr>
       </p:pic>
     </p:spTree>
@@ -13616,7 +14087,7 @@
   <p:cSld>
     <p:spTree>
       <p:nvGrpSpPr>
-        <p:cNvPr id="304" name="Shape 304"/>
+        <p:cNvPr id="302" name="Shape 302"/>
         <p:cNvGrpSpPr/>
         <p:nvPr/>
       </p:nvGrpSpPr>
@@ -13628,6 +14099,140 @@
           <a:chExt cx="0" cy="0"/>
         </a:xfrm>
       </p:grpSpPr>
+      <p:sp>
+        <p:nvSpPr>
+          <p:cNvPr id="303" name="Google Shape;303;p31"/>
+          <p:cNvSpPr txBox="1"/>
+          <p:nvPr>
+            <p:ph type="title"/>
+          </p:nvPr>
+        </p:nvSpPr>
+        <p:spPr>
+          <a:xfrm>
+            <a:off x="204200" y="208750"/>
+            <a:ext cx="4156800" cy="954600"/>
+          </a:xfrm>
+          <a:prstGeom prst="rect">
+            <a:avLst/>
+          </a:prstGeom>
+        </p:spPr>
+        <p:txBody>
+          <a:bodyPr anchorCtr="0" anchor="t" bIns="91425" lIns="91425" spcFirstLastPara="1" rIns="91425" wrap="square" tIns="91425">
+            <a:normAutofit/>
+          </a:bodyPr>
+          <a:lstStyle/>
+          <a:p>
+            <a:pPr indent="0" lvl="0" marL="0" rtl="0" algn="l">
+              <a:spcBef>
+                <a:spcPts val="0"/>
+              </a:spcBef>
+              <a:spcAft>
+                <a:spcPts val="0"/>
+              </a:spcAft>
+              <a:buNone/>
+            </a:pPr>
+            <a:r>
+              <a:rPr lang="en" sz="2600"/>
+              <a:t>Coffea Arabica search time</a:t>
+            </a:r>
+            <a:endParaRPr sz="2600"/>
+          </a:p>
+        </p:txBody>
+      </p:sp>
+      <p:sp>
+        <p:nvSpPr>
+          <p:cNvPr id="304" name="Google Shape;304;p31"/>
+          <p:cNvSpPr txBox="1"/>
+          <p:nvPr>
+            <p:ph type="title"/>
+          </p:nvPr>
+        </p:nvSpPr>
+        <p:spPr>
+          <a:xfrm>
+            <a:off x="204200" y="675000"/>
+            <a:ext cx="8365800" cy="1101300"/>
+          </a:xfrm>
+          <a:prstGeom prst="rect">
+            <a:avLst/>
+          </a:prstGeom>
+        </p:spPr>
+        <p:txBody>
+          <a:bodyPr anchorCtr="0" anchor="t" bIns="91425" lIns="91425" spcFirstLastPara="1" rIns="91425" wrap="square" tIns="91425">
+            <a:normAutofit/>
+          </a:bodyPr>
+          <a:lstStyle/>
+          <a:p>
+            <a:pPr indent="0" lvl="0" marL="0" rtl="0" algn="l">
+              <a:spcBef>
+                <a:spcPts val="0"/>
+              </a:spcBef>
+              <a:spcAft>
+                <a:spcPts val="0"/>
+              </a:spcAft>
+              <a:buNone/>
+            </a:pPr>
+            <a:r>
+              <a:rPr lang="en" sz="1600"/>
+              <a:t>Non optimized:</a:t>
+            </a:r>
+            <a:br>
+              <a:rPr lang="en" sz="1600"/>
+            </a:br>
+            <a:r>
+              <a:rPr lang="en" sz="1350">
+                <a:solidFill>
+                  <a:srgbClr val="073763"/>
+                </a:solidFill>
+              </a:rPr>
+              <a:t>BWT =</a:t>
+            </a:r>
+            <a:r>
+              <a:rPr lang="en" sz="1350"/>
+              <a:t> 77,292s    </a:t>
+            </a:r>
+            <a:r>
+              <a:rPr lang="en" sz="1350">
+                <a:solidFill>
+                  <a:srgbClr val="073763"/>
+                </a:solidFill>
+              </a:rPr>
+              <a:t>ATGCATG:</a:t>
+            </a:r>
+            <a:r>
+              <a:rPr lang="en" sz="1350"/>
+              <a:t> 3,251ms (6529)  </a:t>
+            </a:r>
+            <a:r>
+              <a:rPr lang="en" sz="1350">
+                <a:solidFill>
+                  <a:srgbClr val="073763"/>
+                </a:solidFill>
+              </a:rPr>
+              <a:t>TCTCTCTA:</a:t>
+            </a:r>
+            <a:r>
+              <a:rPr lang="en" sz="1350"/>
+              <a:t> 0,643ms (1262)  </a:t>
+            </a:r>
+            <a:r>
+              <a:rPr lang="en" sz="1350">
+                <a:solidFill>
+                  <a:srgbClr val="073763"/>
+                </a:solidFill>
+              </a:rPr>
+              <a:t>TTCACTACTCTCA:</a:t>
+            </a:r>
+            <a:r>
+              <a:rPr lang="en" sz="1350"/>
+              <a:t> ~0ms (0)</a:t>
+            </a:r>
+            <a:br>
+              <a:rPr lang="en" sz="1600"/>
+            </a:br>
+            <a:endParaRPr sz="1600"/>
+          </a:p>
+        </p:txBody>
+      </p:sp>
       <p:pic>
         <p:nvPicPr>
           <p:cNvPr id="305" name="Google Shape;305;p31" title="Points scored"/>
@@ -13644,8 +14249,8 @@
         </p:blipFill>
         <p:spPr>
           <a:xfrm>
-            <a:off x="199825" y="1258125"/>
-            <a:ext cx="8747451" cy="3678150"/>
+            <a:off x="204200" y="1231825"/>
+            <a:ext cx="8716176" cy="3697900"/>
           </a:xfrm>
           <a:prstGeom prst="rect">
             <a:avLst/>
@@ -13656,160 +14261,6 @@
           </a:ln>
         </p:spPr>
       </p:pic>
-      <p:sp>
-        <p:nvSpPr>
-          <p:cNvPr id="306" name="Google Shape;306;p31"/>
-          <p:cNvSpPr txBox="1"/>
-          <p:nvPr>
-            <p:ph type="title"/>
-          </p:nvPr>
-        </p:nvSpPr>
-        <p:spPr>
-          <a:xfrm>
-            <a:off x="204200" y="208750"/>
-            <a:ext cx="4156800" cy="954600"/>
-          </a:xfrm>
-          <a:prstGeom prst="rect">
-            <a:avLst/>
-          </a:prstGeom>
-        </p:spPr>
-        <p:txBody>
-          <a:bodyPr anchorCtr="0" anchor="t" bIns="91425" lIns="91425" spcFirstLastPara="1" rIns="91425" wrap="square" tIns="91425">
-            <a:normAutofit/>
-          </a:bodyPr>
-          <a:lstStyle/>
-          <a:p>
-            <a:pPr indent="0" lvl="0" marL="0" rtl="0" algn="l">
-              <a:spcBef>
-                <a:spcPts val="0"/>
-              </a:spcBef>
-              <a:spcAft>
-                <a:spcPts val="0"/>
-              </a:spcAft>
-              <a:buNone/>
-            </a:pPr>
-            <a:r>
-              <a:rPr lang="en" sz="2600"/>
-              <a:t>Mus Pahari</a:t>
-            </a:r>
-            <a:r>
-              <a:rPr lang="en" sz="2600"/>
-              <a:t> search time</a:t>
-            </a:r>
-            <a:endParaRPr sz="2600"/>
-          </a:p>
-        </p:txBody>
-      </p:sp>
-      <p:sp>
-        <p:nvSpPr>
-          <p:cNvPr id="307" name="Google Shape;307;p31"/>
-          <p:cNvSpPr txBox="1"/>
-          <p:nvPr>
-            <p:ph type="title"/>
-          </p:nvPr>
-        </p:nvSpPr>
-        <p:spPr>
-          <a:xfrm>
-            <a:off x="204200" y="675000"/>
-            <a:ext cx="8365800" cy="1101300"/>
-          </a:xfrm>
-          <a:prstGeom prst="rect">
-            <a:avLst/>
-          </a:prstGeom>
-        </p:spPr>
-        <p:txBody>
-          <a:bodyPr anchorCtr="0" anchor="t" bIns="91425" lIns="91425" spcFirstLastPara="1" rIns="91425" wrap="square" tIns="91425">
-            <a:normAutofit/>
-          </a:bodyPr>
-          <a:lstStyle/>
-          <a:p>
-            <a:pPr indent="0" lvl="0" marL="0" rtl="0" algn="l">
-              <a:spcBef>
-                <a:spcPts val="0"/>
-              </a:spcBef>
-              <a:spcAft>
-                <a:spcPts val="0"/>
-              </a:spcAft>
-              <a:buNone/>
-            </a:pPr>
-            <a:r>
-              <a:rPr lang="en" sz="1600"/>
-              <a:t>Non optimized:</a:t>
-            </a:r>
-            <a:br>
-              <a:rPr lang="en" sz="1600"/>
-            </a:br>
-            <a:r>
-              <a:rPr lang="en" sz="1300">
-                <a:solidFill>
-                  <a:srgbClr val="073763"/>
-                </a:solidFill>
-              </a:rPr>
-              <a:t>BWT =</a:t>
-            </a:r>
-            <a:r>
-              <a:rPr lang="en" sz="1300"/>
-              <a:t> 222,536s    </a:t>
-            </a:r>
-            <a:r>
-              <a:rPr lang="en" sz="1300">
-                <a:solidFill>
-                  <a:srgbClr val="073763"/>
-                </a:solidFill>
-              </a:rPr>
-              <a:t>ATGCATG:</a:t>
-            </a:r>
-            <a:r>
-              <a:rPr lang="en" sz="1300"/>
-              <a:t> 23,436ms (43200)  </a:t>
-            </a:r>
-            <a:r>
-              <a:rPr lang="en" sz="1300">
-                <a:solidFill>
-                  <a:srgbClr val="073763"/>
-                </a:solidFill>
-              </a:rPr>
-              <a:t>CTCTCTA</a:t>
-            </a:r>
-            <a:r>
-              <a:rPr lang="en" sz="1300">
-                <a:solidFill>
-                  <a:srgbClr val="073763"/>
-                </a:solidFill>
-              </a:rPr>
-              <a:t>:</a:t>
-            </a:r>
-            <a:r>
-              <a:rPr lang="en" sz="1300"/>
-              <a:t> 6,211ms (10237)  </a:t>
-            </a:r>
-            <a:r>
-              <a:rPr lang="en" sz="1300">
-                <a:solidFill>
-                  <a:srgbClr val="073763"/>
-                </a:solidFill>
-              </a:rPr>
-              <a:t>TCACTACTCTCA</a:t>
-            </a:r>
-            <a:r>
-              <a:rPr lang="en" sz="1300">
-                <a:solidFill>
-                  <a:srgbClr val="073763"/>
-                </a:solidFill>
-              </a:rPr>
-              <a:t>:</a:t>
-            </a:r>
-            <a:r>
-              <a:rPr lang="en" sz="1300"/>
-              <a:t> ~0ms (8)</a:t>
-            </a:r>
-            <a:br>
-              <a:rPr lang="en" sz="1600"/>
-            </a:br>
-            <a:endParaRPr sz="1600"/>
-          </a:p>
-        </p:txBody>
-      </p:sp>
     </p:spTree>
   </p:cSld>
   <p:clrMapOvr>
@@ -14052,7 +14503,7 @@
   <p:cSld>
     <p:spTree>
       <p:nvGrpSpPr>
-        <p:cNvPr id="311" name="Shape 311"/>
+        <p:cNvPr id="309" name="Shape 309"/>
         <p:cNvGrpSpPr/>
         <p:nvPr/>
       </p:nvGrpSpPr>
@@ -14066,7 +14517,7 @@
       </p:grpSpPr>
       <p:pic>
         <p:nvPicPr>
-          <p:cNvPr id="312" name="Google Shape;312;p32" title="Points scored"/>
+          <p:cNvPr id="310" name="Google Shape;310;p32" title="Points scored"/>
           <p:cNvPicPr preferRelativeResize="0"/>
           <p:nvPr/>
         </p:nvPicPr>
@@ -14080,8 +14531,8 @@
         </p:blipFill>
         <p:spPr>
           <a:xfrm>
-            <a:off x="199825" y="211625"/>
-            <a:ext cx="8740074" cy="4724650"/>
+            <a:off x="708950" y="194125"/>
+            <a:ext cx="7672149" cy="4743949"/>
           </a:xfrm>
           <a:prstGeom prst="rect">
             <a:avLst/>
@@ -14105,7 +14556,482 @@
   <p:cSld>
     <p:spTree>
       <p:nvGrpSpPr>
-        <p:cNvPr id="316" name="Shape 316"/>
+        <p:cNvPr id="314" name="Shape 314"/>
+        <p:cNvGrpSpPr/>
+        <p:nvPr/>
+      </p:nvGrpSpPr>
+      <p:grpSpPr>
+        <a:xfrm>
+          <a:off x="0" y="0"/>
+          <a:ext cx="0" cy="0"/>
+          <a:chOff x="0" y="0"/>
+          <a:chExt cx="0" cy="0"/>
+        </a:xfrm>
+      </p:grpSpPr>
+      <p:pic>
+        <p:nvPicPr>
+          <p:cNvPr id="315" name="Google Shape;315;p33" title="Points scored"/>
+          <p:cNvPicPr preferRelativeResize="0"/>
+          <p:nvPr/>
+        </p:nvPicPr>
+        <p:blipFill>
+          <a:blip r:embed="rId3">
+            <a:alphaModFix/>
+          </a:blip>
+          <a:stretch>
+            <a:fillRect/>
+          </a:stretch>
+        </p:blipFill>
+        <p:spPr>
+          <a:xfrm>
+            <a:off x="748725" y="207688"/>
+            <a:ext cx="7646550" cy="4728124"/>
+          </a:xfrm>
+          <a:prstGeom prst="rect">
+            <a:avLst/>
+          </a:prstGeom>
+          <a:noFill/>
+          <a:ln>
+            <a:noFill/>
+          </a:ln>
+        </p:spPr>
+      </p:pic>
+    </p:spTree>
+  </p:cSld>
+  <p:clrMapOvr>
+    <a:masterClrMapping/>
+  </p:clrMapOvr>
+</p:sld>
+</file>
+
+<file path=ppt/slides/slide22.xml><?xml version="1.0" encoding="utf-8"?>
+<p:sld xmlns:a="http://schemas.openxmlformats.org/drawingml/2006/main" xmlns:r="http://schemas.openxmlformats.org/officeDocument/2006/relationships" xmlns:mc="http://schemas.openxmlformats.org/markup-compatibility/2006" xmlns:mv="urn:schemas-microsoft-com:mac:vml" xmlns:p="http://schemas.openxmlformats.org/presentationml/2006/main" xmlns:c="http://schemas.openxmlformats.org/drawingml/2006/chart" xmlns:dgm="http://schemas.openxmlformats.org/drawingml/2006/diagram" xmlns:o="urn:schemas-microsoft-com:office:office" xmlns:v="urn:schemas-microsoft-com:vml" xmlns:pvml="urn:schemas-microsoft-com:office:powerpoint" xmlns:com="http://schemas.openxmlformats.org/drawingml/2006/compatibility" xmlns:p14="http://schemas.microsoft.com/office/powerpoint/2010/main" xmlns:p15="http://schemas.microsoft.com/office/powerpoint/2012/main" xmlns:ahyp="http://schemas.microsoft.com/office/drawing/2018/hyperlinkcolor">
+  <p:cSld>
+    <p:spTree>
+      <p:nvGrpSpPr>
+        <p:cNvPr id="319" name="Shape 319"/>
+        <p:cNvGrpSpPr/>
+        <p:nvPr/>
+      </p:nvGrpSpPr>
+      <p:grpSpPr>
+        <a:xfrm>
+          <a:off x="0" y="0"/>
+          <a:ext cx="0" cy="0"/>
+          <a:chOff x="0" y="0"/>
+          <a:chExt cx="0" cy="0"/>
+        </a:xfrm>
+      </p:grpSpPr>
+      <p:pic>
+        <p:nvPicPr>
+          <p:cNvPr id="320" name="Google Shape;320;p34" title="Points scored"/>
+          <p:cNvPicPr preferRelativeResize="0"/>
+          <p:nvPr/>
+        </p:nvPicPr>
+        <p:blipFill>
+          <a:blip r:embed="rId3">
+            <a:alphaModFix/>
+          </a:blip>
+          <a:stretch>
+            <a:fillRect/>
+          </a:stretch>
+        </p:blipFill>
+        <p:spPr>
+          <a:xfrm>
+            <a:off x="192425" y="199825"/>
+            <a:ext cx="8755050" cy="4743851"/>
+          </a:xfrm>
+          <a:prstGeom prst="rect">
+            <a:avLst/>
+          </a:prstGeom>
+          <a:noFill/>
+          <a:ln>
+            <a:noFill/>
+          </a:ln>
+          <a:effectLst>
+            <a:reflection blurRad="0" dir="5400000" dist="38100" endA="0" endPos="30000" fadeDir="5400012" kx="0" rotWithShape="0" algn="bl" stPos="0" sy="-100000" ky="0"/>
+          </a:effectLst>
+        </p:spPr>
+      </p:pic>
+    </p:spTree>
+  </p:cSld>
+  <p:clrMapOvr>
+    <a:masterClrMapping/>
+  </p:clrMapOvr>
+</p:sld>
+</file>
+
+<file path=ppt/slides/slide23.xml><?xml version="1.0" encoding="utf-8"?>
+<p:sld xmlns:a="http://schemas.openxmlformats.org/drawingml/2006/main" xmlns:r="http://schemas.openxmlformats.org/officeDocument/2006/relationships" xmlns:mc="http://schemas.openxmlformats.org/markup-compatibility/2006" xmlns:mv="urn:schemas-microsoft-com:mac:vml" xmlns:p="http://schemas.openxmlformats.org/presentationml/2006/main" xmlns:c="http://schemas.openxmlformats.org/drawingml/2006/chart" xmlns:dgm="http://schemas.openxmlformats.org/drawingml/2006/diagram" xmlns:o="urn:schemas-microsoft-com:office:office" xmlns:v="urn:schemas-microsoft-com:vml" xmlns:pvml="urn:schemas-microsoft-com:office:powerpoint" xmlns:com="http://schemas.openxmlformats.org/drawingml/2006/compatibility" xmlns:p14="http://schemas.microsoft.com/office/powerpoint/2010/main" xmlns:p15="http://schemas.microsoft.com/office/powerpoint/2012/main" xmlns:ahyp="http://schemas.microsoft.com/office/drawing/2018/hyperlinkcolor">
+  <p:cSld>
+    <p:spTree>
+      <p:nvGrpSpPr>
+        <p:cNvPr id="324" name="Shape 324"/>
+        <p:cNvGrpSpPr/>
+        <p:nvPr/>
+      </p:nvGrpSpPr>
+      <p:grpSpPr>
+        <a:xfrm>
+          <a:off x="0" y="0"/>
+          <a:ext cx="0" cy="0"/>
+          <a:chOff x="0" y="0"/>
+          <a:chExt cx="0" cy="0"/>
+        </a:xfrm>
+      </p:grpSpPr>
+      <p:pic>
+        <p:nvPicPr>
+          <p:cNvPr id="325" name="Google Shape;325;p35" title="Points scored"/>
+          <p:cNvPicPr preferRelativeResize="0"/>
+          <p:nvPr/>
+        </p:nvPicPr>
+        <p:blipFill>
+          <a:blip r:embed="rId3">
+            <a:alphaModFix/>
+          </a:blip>
+          <a:stretch>
+            <a:fillRect/>
+          </a:stretch>
+        </p:blipFill>
+        <p:spPr>
+          <a:xfrm>
+            <a:off x="199825" y="1258125"/>
+            <a:ext cx="8747451" cy="3678150"/>
+          </a:xfrm>
+          <a:prstGeom prst="rect">
+            <a:avLst/>
+          </a:prstGeom>
+          <a:noFill/>
+          <a:ln>
+            <a:noFill/>
+          </a:ln>
+        </p:spPr>
+      </p:pic>
+      <p:sp>
+        <p:nvSpPr>
+          <p:cNvPr id="326" name="Google Shape;326;p35"/>
+          <p:cNvSpPr txBox="1"/>
+          <p:nvPr>
+            <p:ph type="title"/>
+          </p:nvPr>
+        </p:nvSpPr>
+        <p:spPr>
+          <a:xfrm>
+            <a:off x="204200" y="208750"/>
+            <a:ext cx="4156800" cy="954600"/>
+          </a:xfrm>
+          <a:prstGeom prst="rect">
+            <a:avLst/>
+          </a:prstGeom>
+        </p:spPr>
+        <p:txBody>
+          <a:bodyPr anchorCtr="0" anchor="t" bIns="91425" lIns="91425" spcFirstLastPara="1" rIns="91425" wrap="square" tIns="91425">
+            <a:normAutofit/>
+          </a:bodyPr>
+          <a:lstStyle/>
+          <a:p>
+            <a:pPr indent="0" lvl="0" marL="0" rtl="0" algn="l">
+              <a:spcBef>
+                <a:spcPts val="0"/>
+              </a:spcBef>
+              <a:spcAft>
+                <a:spcPts val="0"/>
+              </a:spcAft>
+              <a:buNone/>
+            </a:pPr>
+            <a:r>
+              <a:rPr lang="en" sz="2600"/>
+              <a:t>Mus Pahari</a:t>
+            </a:r>
+            <a:r>
+              <a:rPr lang="en" sz="2600"/>
+              <a:t> search time</a:t>
+            </a:r>
+            <a:endParaRPr sz="2600"/>
+          </a:p>
+        </p:txBody>
+      </p:sp>
+      <p:sp>
+        <p:nvSpPr>
+          <p:cNvPr id="327" name="Google Shape;327;p35"/>
+          <p:cNvSpPr txBox="1"/>
+          <p:nvPr>
+            <p:ph type="title"/>
+          </p:nvPr>
+        </p:nvSpPr>
+        <p:spPr>
+          <a:xfrm>
+            <a:off x="204200" y="675000"/>
+            <a:ext cx="8365800" cy="1101300"/>
+          </a:xfrm>
+          <a:prstGeom prst="rect">
+            <a:avLst/>
+          </a:prstGeom>
+        </p:spPr>
+        <p:txBody>
+          <a:bodyPr anchorCtr="0" anchor="t" bIns="91425" lIns="91425" spcFirstLastPara="1" rIns="91425" wrap="square" tIns="91425">
+            <a:normAutofit/>
+          </a:bodyPr>
+          <a:lstStyle/>
+          <a:p>
+            <a:pPr indent="0" lvl="0" marL="0" rtl="0" algn="l">
+              <a:spcBef>
+                <a:spcPts val="0"/>
+              </a:spcBef>
+              <a:spcAft>
+                <a:spcPts val="0"/>
+              </a:spcAft>
+              <a:buNone/>
+            </a:pPr>
+            <a:r>
+              <a:rPr lang="en" sz="1600"/>
+              <a:t>Non optimized:</a:t>
+            </a:r>
+            <a:br>
+              <a:rPr lang="en" sz="1600"/>
+            </a:br>
+            <a:r>
+              <a:rPr lang="en" sz="1300">
+                <a:solidFill>
+                  <a:srgbClr val="073763"/>
+                </a:solidFill>
+              </a:rPr>
+              <a:t>BWT =</a:t>
+            </a:r>
+            <a:r>
+              <a:rPr lang="en" sz="1300"/>
+              <a:t> 222,536s    </a:t>
+            </a:r>
+            <a:r>
+              <a:rPr lang="en" sz="1300">
+                <a:solidFill>
+                  <a:srgbClr val="073763"/>
+                </a:solidFill>
+              </a:rPr>
+              <a:t>ATGCATG:</a:t>
+            </a:r>
+            <a:r>
+              <a:rPr lang="en" sz="1300"/>
+              <a:t> 23,436ms (43200)  </a:t>
+            </a:r>
+            <a:r>
+              <a:rPr lang="en" sz="1300">
+                <a:solidFill>
+                  <a:srgbClr val="073763"/>
+                </a:solidFill>
+              </a:rPr>
+              <a:t>CTCTCTA</a:t>
+            </a:r>
+            <a:r>
+              <a:rPr lang="en" sz="1300">
+                <a:solidFill>
+                  <a:srgbClr val="073763"/>
+                </a:solidFill>
+              </a:rPr>
+              <a:t>:</a:t>
+            </a:r>
+            <a:r>
+              <a:rPr lang="en" sz="1300"/>
+              <a:t> 6,211ms (10237)  </a:t>
+            </a:r>
+            <a:r>
+              <a:rPr lang="en" sz="1300">
+                <a:solidFill>
+                  <a:srgbClr val="073763"/>
+                </a:solidFill>
+              </a:rPr>
+              <a:t>TCACTACTCTCA</a:t>
+            </a:r>
+            <a:r>
+              <a:rPr lang="en" sz="1300">
+                <a:solidFill>
+                  <a:srgbClr val="073763"/>
+                </a:solidFill>
+              </a:rPr>
+              <a:t>:</a:t>
+            </a:r>
+            <a:r>
+              <a:rPr lang="en" sz="1300"/>
+              <a:t> ~0ms (8)</a:t>
+            </a:r>
+            <a:br>
+              <a:rPr lang="en" sz="1600"/>
+            </a:br>
+            <a:endParaRPr sz="1600"/>
+          </a:p>
+        </p:txBody>
+      </p:sp>
+    </p:spTree>
+  </p:cSld>
+  <p:clrMapOvr>
+    <a:masterClrMapping/>
+  </p:clrMapOvr>
+</p:sld>
+</file>
+
+<file path=ppt/slides/slide24.xml><?xml version="1.0" encoding="utf-8"?>
+<p:sld xmlns:a="http://schemas.openxmlformats.org/drawingml/2006/main" xmlns:r="http://schemas.openxmlformats.org/officeDocument/2006/relationships" xmlns:mc="http://schemas.openxmlformats.org/markup-compatibility/2006" xmlns:mv="urn:schemas-microsoft-com:mac:vml" xmlns:p="http://schemas.openxmlformats.org/presentationml/2006/main" xmlns:c="http://schemas.openxmlformats.org/drawingml/2006/chart" xmlns:dgm="http://schemas.openxmlformats.org/drawingml/2006/diagram" xmlns:o="urn:schemas-microsoft-com:office:office" xmlns:v="urn:schemas-microsoft-com:vml" xmlns:pvml="urn:schemas-microsoft-com:office:powerpoint" xmlns:com="http://schemas.openxmlformats.org/drawingml/2006/compatibility" xmlns:p14="http://schemas.microsoft.com/office/powerpoint/2010/main" xmlns:p15="http://schemas.microsoft.com/office/powerpoint/2012/main" xmlns:ahyp="http://schemas.microsoft.com/office/drawing/2018/hyperlinkcolor">
+  <p:cSld>
+    <p:spTree>
+      <p:nvGrpSpPr>
+        <p:cNvPr id="331" name="Shape 331"/>
+        <p:cNvGrpSpPr/>
+        <p:nvPr/>
+      </p:nvGrpSpPr>
+      <p:grpSpPr>
+        <a:xfrm>
+          <a:off x="0" y="0"/>
+          <a:ext cx="0" cy="0"/>
+          <a:chOff x="0" y="0"/>
+          <a:chExt cx="0" cy="0"/>
+        </a:xfrm>
+      </p:grpSpPr>
+      <p:pic>
+        <p:nvPicPr>
+          <p:cNvPr id="332" name="Google Shape;332;p36" title="Points scored"/>
+          <p:cNvPicPr preferRelativeResize="0"/>
+          <p:nvPr/>
+        </p:nvPicPr>
+        <p:blipFill>
+          <a:blip r:embed="rId3">
+            <a:alphaModFix/>
+          </a:blip>
+          <a:stretch>
+            <a:fillRect/>
+          </a:stretch>
+        </p:blipFill>
+        <p:spPr>
+          <a:xfrm>
+            <a:off x="578475" y="188875"/>
+            <a:ext cx="7707426" cy="4765749"/>
+          </a:xfrm>
+          <a:prstGeom prst="rect">
+            <a:avLst/>
+          </a:prstGeom>
+          <a:noFill/>
+          <a:ln>
+            <a:noFill/>
+          </a:ln>
+        </p:spPr>
+      </p:pic>
+    </p:spTree>
+  </p:cSld>
+  <p:clrMapOvr>
+    <a:masterClrMapping/>
+  </p:clrMapOvr>
+</p:sld>
+</file>
+
+<file path=ppt/slides/slide25.xml><?xml version="1.0" encoding="utf-8"?>
+<p:sld xmlns:a="http://schemas.openxmlformats.org/drawingml/2006/main" xmlns:r="http://schemas.openxmlformats.org/officeDocument/2006/relationships" xmlns:mc="http://schemas.openxmlformats.org/markup-compatibility/2006" xmlns:mv="urn:schemas-microsoft-com:mac:vml" xmlns:p="http://schemas.openxmlformats.org/presentationml/2006/main" xmlns:c="http://schemas.openxmlformats.org/drawingml/2006/chart" xmlns:dgm="http://schemas.openxmlformats.org/drawingml/2006/diagram" xmlns:o="urn:schemas-microsoft-com:office:office" xmlns:v="urn:schemas-microsoft-com:vml" xmlns:pvml="urn:schemas-microsoft-com:office:powerpoint" xmlns:com="http://schemas.openxmlformats.org/drawingml/2006/compatibility" xmlns:p14="http://schemas.microsoft.com/office/powerpoint/2010/main" xmlns:p15="http://schemas.microsoft.com/office/powerpoint/2012/main" xmlns:ahyp="http://schemas.microsoft.com/office/drawing/2018/hyperlinkcolor">
+  <p:cSld>
+    <p:spTree>
+      <p:nvGrpSpPr>
+        <p:cNvPr id="336" name="Shape 336"/>
+        <p:cNvGrpSpPr/>
+        <p:nvPr/>
+      </p:nvGrpSpPr>
+      <p:grpSpPr>
+        <a:xfrm>
+          <a:off x="0" y="0"/>
+          <a:ext cx="0" cy="0"/>
+          <a:chOff x="0" y="0"/>
+          <a:chExt cx="0" cy="0"/>
+        </a:xfrm>
+      </p:grpSpPr>
+      <p:pic>
+        <p:nvPicPr>
+          <p:cNvPr id="337" name="Google Shape;337;p37" title="Points scored"/>
+          <p:cNvPicPr preferRelativeResize="0"/>
+          <p:nvPr/>
+        </p:nvPicPr>
+        <p:blipFill>
+          <a:blip r:embed="rId3">
+            <a:alphaModFix/>
+          </a:blip>
+          <a:stretch>
+            <a:fillRect/>
+          </a:stretch>
+        </p:blipFill>
+        <p:spPr>
+          <a:xfrm>
+            <a:off x="788312" y="232175"/>
+            <a:ext cx="7567374" cy="4679150"/>
+          </a:xfrm>
+          <a:prstGeom prst="rect">
+            <a:avLst/>
+          </a:prstGeom>
+          <a:noFill/>
+          <a:ln>
+            <a:noFill/>
+          </a:ln>
+        </p:spPr>
+      </p:pic>
+    </p:spTree>
+  </p:cSld>
+  <p:clrMapOvr>
+    <a:masterClrMapping/>
+  </p:clrMapOvr>
+</p:sld>
+</file>
+
+<file path=ppt/slides/slide26.xml><?xml version="1.0" encoding="utf-8"?>
+<p:sld xmlns:a="http://schemas.openxmlformats.org/drawingml/2006/main" xmlns:r="http://schemas.openxmlformats.org/officeDocument/2006/relationships" xmlns:mc="http://schemas.openxmlformats.org/markup-compatibility/2006" xmlns:mv="urn:schemas-microsoft-com:mac:vml" xmlns:p="http://schemas.openxmlformats.org/presentationml/2006/main" xmlns:c="http://schemas.openxmlformats.org/drawingml/2006/chart" xmlns:dgm="http://schemas.openxmlformats.org/drawingml/2006/diagram" xmlns:o="urn:schemas-microsoft-com:office:office" xmlns:v="urn:schemas-microsoft-com:vml" xmlns:pvml="urn:schemas-microsoft-com:office:powerpoint" xmlns:com="http://schemas.openxmlformats.org/drawingml/2006/compatibility" xmlns:p14="http://schemas.microsoft.com/office/powerpoint/2010/main" xmlns:p15="http://schemas.microsoft.com/office/powerpoint/2012/main" xmlns:ahyp="http://schemas.microsoft.com/office/drawing/2018/hyperlinkcolor">
+  <p:cSld>
+    <p:spTree>
+      <p:nvGrpSpPr>
+        <p:cNvPr id="341" name="Shape 341"/>
+        <p:cNvGrpSpPr/>
+        <p:nvPr/>
+      </p:nvGrpSpPr>
+      <p:grpSpPr>
+        <a:xfrm>
+          <a:off x="0" y="0"/>
+          <a:ext cx="0" cy="0"/>
+          <a:chOff x="0" y="0"/>
+          <a:chExt cx="0" cy="0"/>
+        </a:xfrm>
+      </p:grpSpPr>
+      <p:pic>
+        <p:nvPicPr>
+          <p:cNvPr id="342" name="Google Shape;342;p38" title="Points scored"/>
+          <p:cNvPicPr preferRelativeResize="0"/>
+          <p:nvPr/>
+        </p:nvPicPr>
+        <p:blipFill>
+          <a:blip r:embed="rId3">
+            <a:alphaModFix/>
+          </a:blip>
+          <a:stretch>
+            <a:fillRect/>
+          </a:stretch>
+        </p:blipFill>
+        <p:spPr>
+          <a:xfrm>
+            <a:off x="199825" y="211625"/>
+            <a:ext cx="8740074" cy="4724650"/>
+          </a:xfrm>
+          <a:prstGeom prst="rect">
+            <a:avLst/>
+          </a:prstGeom>
+          <a:noFill/>
+          <a:ln>
+            <a:noFill/>
+          </a:ln>
+        </p:spPr>
+      </p:pic>
+    </p:spTree>
+  </p:cSld>
+  <p:clrMapOvr>
+    <a:masterClrMapping/>
+  </p:clrMapOvr>
+</p:sld>
+</file>
+
+<file path=ppt/slides/slide27.xml><?xml version="1.0" encoding="utf-8"?>
+<p:sld xmlns:a="http://schemas.openxmlformats.org/drawingml/2006/main" xmlns:r="http://schemas.openxmlformats.org/officeDocument/2006/relationships" xmlns:mc="http://schemas.openxmlformats.org/markup-compatibility/2006" xmlns:mv="urn:schemas-microsoft-com:mac:vml" xmlns:p="http://schemas.openxmlformats.org/presentationml/2006/main" xmlns:c="http://schemas.openxmlformats.org/drawingml/2006/chart" xmlns:dgm="http://schemas.openxmlformats.org/drawingml/2006/diagram" xmlns:o="urn:schemas-microsoft-com:office:office" xmlns:v="urn:schemas-microsoft-com:vml" xmlns:pvml="urn:schemas-microsoft-com:office:powerpoint" xmlns:com="http://schemas.openxmlformats.org/drawingml/2006/compatibility" xmlns:p14="http://schemas.microsoft.com/office/powerpoint/2010/main" xmlns:p15="http://schemas.microsoft.com/office/powerpoint/2012/main" xmlns:ahyp="http://schemas.microsoft.com/office/drawing/2018/hyperlinkcolor">
+  <p:cSld>
+    <p:spTree>
+      <p:nvGrpSpPr>
+        <p:cNvPr id="346" name="Shape 346"/>
         <p:cNvGrpSpPr/>
         <p:nvPr/>
       </p:nvGrpSpPr>
@@ -14119,7 +15045,7 @@
       </p:grpSpPr>
       <p:sp>
         <p:nvSpPr>
-          <p:cNvPr id="317" name="Google Shape;317;p33"/>
+          <p:cNvPr id="347" name="Google Shape;347;p39"/>
           <p:cNvSpPr txBox="1"/>
           <p:nvPr>
             <p:ph idx="1" type="body"/>
@@ -14189,7 +15115,7 @@
       </p:sp>
       <p:sp>
         <p:nvSpPr>
-          <p:cNvPr id="318" name="Google Shape;318;p33"/>
+          <p:cNvPr id="348" name="Google Shape;348;p39"/>
           <p:cNvSpPr txBox="1"/>
           <p:nvPr>
             <p:ph type="title"/>
@@ -17869,6 +18795,285 @@
 </file>
 
 <file path=ppt/theme/theme1.xml><?xml version="1.0" encoding="utf-8"?>
+<a:theme xmlns:a="http://schemas.openxmlformats.org/drawingml/2006/main" xmlns:r="http://schemas.openxmlformats.org/officeDocument/2006/relationships">
+  <a:themeElements>
+    <a:clrScheme name="Default">
+      <a:dk1>
+        <a:srgbClr val="000000"/>
+      </a:dk1>
+      <a:lt1>
+        <a:srgbClr val="FFFFFF"/>
+      </a:lt1>
+      <a:dk2>
+        <a:srgbClr val="158158"/>
+      </a:dk2>
+      <a:lt2>
+        <a:srgbClr val="F3F3F3"/>
+      </a:lt2>
+      <a:accent1>
+        <a:srgbClr val="058DC7"/>
+      </a:accent1>
+      <a:accent2>
+        <a:srgbClr val="50B432"/>
+      </a:accent2>
+      <a:accent3>
+        <a:srgbClr val="ED561B"/>
+      </a:accent3>
+      <a:accent4>
+        <a:srgbClr val="EDEF00"/>
+      </a:accent4>
+      <a:accent5>
+        <a:srgbClr val="24CBE5"/>
+      </a:accent5>
+      <a:accent6>
+        <a:srgbClr val="64E572"/>
+      </a:accent6>
+      <a:hlink>
+        <a:srgbClr val="2200CC"/>
+      </a:hlink>
+      <a:folHlink>
+        <a:srgbClr val="551A8B"/>
+      </a:folHlink>
+    </a:clrScheme>
+    <a:fontScheme name="Office">
+      <a:majorFont>
+        <a:latin typeface="Arial"/>
+        <a:ea typeface=""/>
+        <a:cs typeface=""/>
+        <a:font script="Jpan" typeface="ＭＳ Ｐゴシック"/>
+        <a:font script="Hang" typeface="맑은 고딕"/>
+        <a:font script="Hans" typeface="宋体"/>
+        <a:font script="Hant" typeface="新細明體"/>
+        <a:font script="Arab" typeface="Times New Roman"/>
+        <a:font script="Hebr" typeface="Times New Roman"/>
+        <a:font script="Thai" typeface="Angsana New"/>
+        <a:font script="Ethi" typeface="Nyala"/>
+        <a:font script="Beng" typeface="Vrinda"/>
+        <a:font script="Gujr" typeface="Shruti"/>
+        <a:font script="Khmr" typeface="MoolBoran"/>
+        <a:font script="Knda" typeface="Tunga"/>
+        <a:font script="Guru" typeface="Raavi"/>
+        <a:font script="Cans" typeface="Euphemia"/>
+        <a:font script="Cher" typeface="Plantagenet Cherokee"/>
+        <a:font script="Yiii" typeface="Microsoft Yi Baiti"/>
+        <a:font script="Tibt" typeface="Microsoft Himalaya"/>
+        <a:font script="Thaa" typeface="MV Boli"/>
+        <a:font script="Deva" typeface="Mangal"/>
+        <a:font script="Telu" typeface="Gautami"/>
+        <a:font script="Taml" typeface="Latha"/>
+        <a:font script="Syrc" typeface="Estrangelo Edessa"/>
+        <a:font script="Orya" typeface="Kalinga"/>
+        <a:font script="Mlym" typeface="Kartika"/>
+        <a:font script="Laoo" typeface="DokChampa"/>
+        <a:font script="Sinh" typeface="Iskoola Pota"/>
+        <a:font script="Mong" typeface="Mongolian Baiti"/>
+        <a:font script="Viet" typeface="Times New Roman"/>
+        <a:font script="Uigh" typeface="Microsoft Uighur"/>
+        <a:font script="Geor" typeface="Sylfaen"/>
+      </a:majorFont>
+      <a:minorFont>
+        <a:latin typeface="Arial"/>
+        <a:ea typeface=""/>
+        <a:cs typeface=""/>
+        <a:font script="Jpan" typeface="ＭＳ Ｐゴシック"/>
+        <a:font script="Hang" typeface="맑은 고딕"/>
+        <a:font script="Hans" typeface="宋体"/>
+        <a:font script="Hant" typeface="新細明體"/>
+        <a:font script="Arab" typeface="Arial"/>
+        <a:font script="Hebr" typeface="Arial"/>
+        <a:font script="Thai" typeface="Cordia New"/>
+        <a:font script="Ethi" typeface="Nyala"/>
+        <a:font script="Beng" typeface="Vrinda"/>
+        <a:font script="Gujr" typeface="Shruti"/>
+        <a:font script="Khmr" typeface="DaunPenh"/>
+        <a:font script="Knda" typeface="Tunga"/>
+        <a:font script="Guru" typeface="Raavi"/>
+        <a:font script="Cans" typeface="Euphemia"/>
+        <a:font script="Cher" typeface="Plantagenet Cherokee"/>
+        <a:font script="Yiii" typeface="Microsoft Yi Baiti"/>
+        <a:font script="Tibt" typeface="Microsoft Himalaya"/>
+        <a:font script="Thaa" typeface="MV Boli"/>
+        <a:font script="Deva" typeface="Mangal"/>
+        <a:font script="Telu" typeface="Gautami"/>
+        <a:font script="Taml" typeface="Latha"/>
+        <a:font script="Syrc" typeface="Estrangelo Edessa"/>
+        <a:font script="Orya" typeface="Kalinga"/>
+        <a:font script="Mlym" typeface="Kartika"/>
+        <a:font script="Laoo" typeface="DokChampa"/>
+        <a:font script="Sinh" typeface="Iskoola Pota"/>
+        <a:font script="Mong" typeface="Mongolian Baiti"/>
+        <a:font script="Viet" typeface="Arial"/>
+        <a:font script="Uigh" typeface="Microsoft Uighur"/>
+        <a:font script="Geor" typeface="Sylfaen"/>
+      </a:minorFont>
+    </a:fontScheme>
+    <a:fmtScheme name="Office">
+      <a:fillStyleLst>
+        <a:solidFill>
+          <a:schemeClr val="phClr"/>
+        </a:solidFill>
+        <a:gradFill rotWithShape="1">
+          <a:gsLst>
+            <a:gs pos="0">
+              <a:schemeClr val="phClr">
+                <a:tint val="50000"/>
+                <a:satMod val="300000"/>
+              </a:schemeClr>
+            </a:gs>
+            <a:gs pos="35000">
+              <a:schemeClr val="phClr">
+                <a:tint val="37000"/>
+                <a:satMod val="300000"/>
+              </a:schemeClr>
+            </a:gs>
+            <a:gs pos="100000">
+              <a:schemeClr val="phClr">
+                <a:tint val="15000"/>
+                <a:satMod val="350000"/>
+              </a:schemeClr>
+            </a:gs>
+          </a:gsLst>
+          <a:lin ang="16200000" scaled="1"/>
+        </a:gradFill>
+        <a:gradFill rotWithShape="1">
+          <a:gsLst>
+            <a:gs pos="0">
+              <a:schemeClr val="phClr">
+                <a:tint val="100000"/>
+                <a:shade val="100000"/>
+                <a:satMod val="130000"/>
+              </a:schemeClr>
+            </a:gs>
+            <a:gs pos="100000">
+              <a:schemeClr val="phClr">
+                <a:tint val="50000"/>
+                <a:shade val="100000"/>
+                <a:satMod val="350000"/>
+              </a:schemeClr>
+            </a:gs>
+          </a:gsLst>
+          <a:lin ang="16200000" scaled="0"/>
+        </a:gradFill>
+      </a:fillStyleLst>
+      <a:lnStyleLst>
+        <a:ln w="9525" cap="flat" cmpd="sng" algn="ctr">
+          <a:solidFill>
+            <a:schemeClr val="phClr">
+              <a:shade val="95000"/>
+              <a:satMod val="105000"/>
+            </a:schemeClr>
+          </a:solidFill>
+          <a:prstDash val="solid"/>
+        </a:ln>
+        <a:ln w="25400" cap="flat" cmpd="sng" algn="ctr">
+          <a:solidFill>
+            <a:schemeClr val="phClr"/>
+          </a:solidFill>
+          <a:prstDash val="solid"/>
+        </a:ln>
+        <a:ln w="38100" cap="flat" cmpd="sng" algn="ctr">
+          <a:solidFill>
+            <a:schemeClr val="phClr"/>
+          </a:solidFill>
+          <a:prstDash val="solid"/>
+        </a:ln>
+      </a:lnStyleLst>
+      <a:effectStyleLst>
+        <a:effectStyle>
+          <a:effectLst>
+            <a:outerShdw blurRad="40000" dist="20000" dir="5400000" rotWithShape="0">
+              <a:srgbClr val="000000">
+                <a:alpha val="38000"/>
+              </a:srgbClr>
+            </a:outerShdw>
+          </a:effectLst>
+        </a:effectStyle>
+        <a:effectStyle>
+          <a:effectLst>
+            <a:outerShdw blurRad="40000" dist="23000" dir="5400000" rotWithShape="0">
+              <a:srgbClr val="000000">
+                <a:alpha val="35000"/>
+              </a:srgbClr>
+            </a:outerShdw>
+          </a:effectLst>
+        </a:effectStyle>
+        <a:effectStyle>
+          <a:effectLst>
+            <a:outerShdw blurRad="40000" dist="23000" dir="5400000" rotWithShape="0">
+              <a:srgbClr val="000000">
+                <a:alpha val="35000"/>
+              </a:srgbClr>
+            </a:outerShdw>
+          </a:effectLst>
+          <a:scene3d>
+            <a:camera prst="orthographicFront">
+              <a:rot lat="0" lon="0" rev="0"/>
+            </a:camera>
+            <a:lightRig rig="threePt" dir="t">
+              <a:rot lat="0" lon="0" rev="1200000"/>
+            </a:lightRig>
+          </a:scene3d>
+          <a:sp3d>
+            <a:bevelT w="63500" h="25400"/>
+          </a:sp3d>
+        </a:effectStyle>
+      </a:effectStyleLst>
+      <a:bgFillStyleLst>
+        <a:solidFill>
+          <a:schemeClr val="phClr"/>
+        </a:solidFill>
+        <a:gradFill rotWithShape="1">
+          <a:gsLst>
+            <a:gs pos="0">
+              <a:schemeClr val="phClr">
+                <a:tint val="40000"/>
+                <a:satMod val="350000"/>
+              </a:schemeClr>
+            </a:gs>
+            <a:gs pos="40000">
+              <a:schemeClr val="phClr">
+                <a:tint val="45000"/>
+                <a:shade val="99000"/>
+                <a:satMod val="350000"/>
+              </a:schemeClr>
+            </a:gs>
+            <a:gs pos="100000">
+              <a:schemeClr val="phClr">
+                <a:shade val="20000"/>
+                <a:satMod val="255000"/>
+              </a:schemeClr>
+            </a:gs>
+          </a:gsLst>
+          <a:path path="circle">
+            <a:fillToRect l="50000" t="-80000" r="50000" b="180000"/>
+          </a:path>
+        </a:gradFill>
+        <a:gradFill rotWithShape="1">
+          <a:gsLst>
+            <a:gs pos="0">
+              <a:schemeClr val="phClr">
+                <a:tint val="80000"/>
+                <a:satMod val="300000"/>
+              </a:schemeClr>
+            </a:gs>
+            <a:gs pos="100000">
+              <a:schemeClr val="phClr">
+                <a:shade val="30000"/>
+                <a:satMod val="200000"/>
+              </a:schemeClr>
+            </a:gs>
+          </a:gsLst>
+          <a:path path="circle">
+            <a:fillToRect l="50000" t="50000" r="50000" b="50000"/>
+          </a:path>
+        </a:gradFill>
+      </a:bgFillStyleLst>
+    </a:fmtScheme>
+  </a:themeElements>
+</a:theme>
+</file>
+
+<file path=ppt/theme/theme2.xml><?xml version="1.0" encoding="utf-8"?>
 <a:theme xmlns:a="http://schemas.openxmlformats.org/drawingml/2006/main" xmlns:r="http://schemas.openxmlformats.org/officeDocument/2006/relationships" name="Shift">
   <a:themeElements>
     <a:clrScheme name="Shift">
@@ -18145,283 +19350,4 @@
     </a:fmtScheme>
   </a:themeElements>
 </a:theme>
-</file>
-
-<file path=ppt/theme/theme2.xml><?xml version="1.0" encoding="utf-8"?>
-<a:theme xmlns:a="http://schemas.openxmlformats.org/drawingml/2006/main" xmlns:r="http://schemas.openxmlformats.org/officeDocument/2006/relationships">
-  <a:themeElements>
-    <a:clrScheme name="Default">
-      <a:dk1>
-        <a:srgbClr val="000000"/>
-      </a:dk1>
-      <a:lt1>
-        <a:srgbClr val="FFFFFF"/>
-      </a:lt1>
-      <a:dk2>
-        <a:srgbClr val="158158"/>
-      </a:dk2>
-      <a:lt2>
-        <a:srgbClr val="F3F3F3"/>
-      </a:lt2>
-      <a:accent1>
-        <a:srgbClr val="058DC7"/>
-      </a:accent1>
-      <a:accent2>
-        <a:srgbClr val="50B432"/>
-      </a:accent2>
-      <a:accent3>
-        <a:srgbClr val="ED561B"/>
-      </a:accent3>
-      <a:accent4>
-        <a:srgbClr val="EDEF00"/>
-      </a:accent4>
-      <a:accent5>
-        <a:srgbClr val="24CBE5"/>
-      </a:accent5>
-      <a:accent6>
-        <a:srgbClr val="64E572"/>
-      </a:accent6>
-      <a:hlink>
-        <a:srgbClr val="2200CC"/>
-      </a:hlink>
-      <a:folHlink>
-        <a:srgbClr val="551A8B"/>
-      </a:folHlink>
-    </a:clrScheme>
-    <a:fontScheme name="Office">
-      <a:majorFont>
-        <a:latin typeface="Arial"/>
-        <a:ea typeface=""/>
-        <a:cs typeface=""/>
-        <a:font script="Jpan" typeface="ＭＳ Ｐゴシック"/>
-        <a:font script="Hang" typeface="맑은 고딕"/>
-        <a:font script="Hans" typeface="宋体"/>
-        <a:font script="Hant" typeface="新細明體"/>
-        <a:font script="Arab" typeface="Times New Roman"/>
-        <a:font script="Hebr" typeface="Times New Roman"/>
-        <a:font script="Thai" typeface="Angsana New"/>
-        <a:font script="Ethi" typeface="Nyala"/>
-        <a:font script="Beng" typeface="Vrinda"/>
-        <a:font script="Gujr" typeface="Shruti"/>
-        <a:font script="Khmr" typeface="MoolBoran"/>
-        <a:font script="Knda" typeface="Tunga"/>
-        <a:font script="Guru" typeface="Raavi"/>
-        <a:font script="Cans" typeface="Euphemia"/>
-        <a:font script="Cher" typeface="Plantagenet Cherokee"/>
-        <a:font script="Yiii" typeface="Microsoft Yi Baiti"/>
-        <a:font script="Tibt" typeface="Microsoft Himalaya"/>
-        <a:font script="Thaa" typeface="MV Boli"/>
-        <a:font script="Deva" typeface="Mangal"/>
-        <a:font script="Telu" typeface="Gautami"/>
-        <a:font script="Taml" typeface="Latha"/>
-        <a:font script="Syrc" typeface="Estrangelo Edessa"/>
-        <a:font script="Orya" typeface="Kalinga"/>
-        <a:font script="Mlym" typeface="Kartika"/>
-        <a:font script="Laoo" typeface="DokChampa"/>
-        <a:font script="Sinh" typeface="Iskoola Pota"/>
-        <a:font script="Mong" typeface="Mongolian Baiti"/>
-        <a:font script="Viet" typeface="Times New Roman"/>
-        <a:font script="Uigh" typeface="Microsoft Uighur"/>
-        <a:font script="Geor" typeface="Sylfaen"/>
-      </a:majorFont>
-      <a:minorFont>
-        <a:latin typeface="Arial"/>
-        <a:ea typeface=""/>
-        <a:cs typeface=""/>
-        <a:font script="Jpan" typeface="ＭＳ Ｐゴシック"/>
-        <a:font script="Hang" typeface="맑은 고딕"/>
-        <a:font script="Hans" typeface="宋体"/>
-        <a:font script="Hant" typeface="新細明體"/>
-        <a:font script="Arab" typeface="Arial"/>
-        <a:font script="Hebr" typeface="Arial"/>
-        <a:font script="Thai" typeface="Cordia New"/>
-        <a:font script="Ethi" typeface="Nyala"/>
-        <a:font script="Beng" typeface="Vrinda"/>
-        <a:font script="Gujr" typeface="Shruti"/>
-        <a:font script="Khmr" typeface="DaunPenh"/>
-        <a:font script="Knda" typeface="Tunga"/>
-        <a:font script="Guru" typeface="Raavi"/>
-        <a:font script="Cans" typeface="Euphemia"/>
-        <a:font script="Cher" typeface="Plantagenet Cherokee"/>
-        <a:font script="Yiii" typeface="Microsoft Yi Baiti"/>
-        <a:font script="Tibt" typeface="Microsoft Himalaya"/>
-        <a:font script="Thaa" typeface="MV Boli"/>
-        <a:font script="Deva" typeface="Mangal"/>
-        <a:font script="Telu" typeface="Gautami"/>
-        <a:font script="Taml" typeface="Latha"/>
-        <a:font script="Syrc" typeface="Estrangelo Edessa"/>
-        <a:font script="Orya" typeface="Kalinga"/>
-        <a:font script="Mlym" typeface="Kartika"/>
-        <a:font script="Laoo" typeface="DokChampa"/>
-        <a:font script="Sinh" typeface="Iskoola Pota"/>
-        <a:font script="Mong" typeface="Mongolian Baiti"/>
-        <a:font script="Viet" typeface="Arial"/>
-        <a:font script="Uigh" typeface="Microsoft Uighur"/>
-        <a:font script="Geor" typeface="Sylfaen"/>
-      </a:minorFont>
-    </a:fontScheme>
-    <a:fmtScheme name="Office">
-      <a:fillStyleLst>
-        <a:solidFill>
-          <a:schemeClr val="phClr"/>
-        </a:solidFill>
-        <a:gradFill rotWithShape="1">
-          <a:gsLst>
-            <a:gs pos="0">
-              <a:schemeClr val="phClr">
-                <a:tint val="50000"/>
-                <a:satMod val="300000"/>
-              </a:schemeClr>
-            </a:gs>
-            <a:gs pos="35000">
-              <a:schemeClr val="phClr">
-                <a:tint val="37000"/>
-                <a:satMod val="300000"/>
-              </a:schemeClr>
-            </a:gs>
-            <a:gs pos="100000">
-              <a:schemeClr val="phClr">
-                <a:tint val="15000"/>
-                <a:satMod val="350000"/>
-              </a:schemeClr>
-            </a:gs>
-          </a:gsLst>
-          <a:lin ang="16200000" scaled="1"/>
-        </a:gradFill>
-        <a:gradFill rotWithShape="1">
-          <a:gsLst>
-            <a:gs pos="0">
-              <a:schemeClr val="phClr">
-                <a:tint val="100000"/>
-                <a:shade val="100000"/>
-                <a:satMod val="130000"/>
-              </a:schemeClr>
-            </a:gs>
-            <a:gs pos="100000">
-              <a:schemeClr val="phClr">
-                <a:tint val="50000"/>
-                <a:shade val="100000"/>
-                <a:satMod val="350000"/>
-              </a:schemeClr>
-            </a:gs>
-          </a:gsLst>
-          <a:lin ang="16200000" scaled="0"/>
-        </a:gradFill>
-      </a:fillStyleLst>
-      <a:lnStyleLst>
-        <a:ln w="9525" cap="flat" cmpd="sng" algn="ctr">
-          <a:solidFill>
-            <a:schemeClr val="phClr">
-              <a:shade val="95000"/>
-              <a:satMod val="105000"/>
-            </a:schemeClr>
-          </a:solidFill>
-          <a:prstDash val="solid"/>
-        </a:ln>
-        <a:ln w="25400" cap="flat" cmpd="sng" algn="ctr">
-          <a:solidFill>
-            <a:schemeClr val="phClr"/>
-          </a:solidFill>
-          <a:prstDash val="solid"/>
-        </a:ln>
-        <a:ln w="38100" cap="flat" cmpd="sng" algn="ctr">
-          <a:solidFill>
-            <a:schemeClr val="phClr"/>
-          </a:solidFill>
-          <a:prstDash val="solid"/>
-        </a:ln>
-      </a:lnStyleLst>
-      <a:effectStyleLst>
-        <a:effectStyle>
-          <a:effectLst>
-            <a:outerShdw blurRad="40000" dist="20000" dir="5400000" rotWithShape="0">
-              <a:srgbClr val="000000">
-                <a:alpha val="38000"/>
-              </a:srgbClr>
-            </a:outerShdw>
-          </a:effectLst>
-        </a:effectStyle>
-        <a:effectStyle>
-          <a:effectLst>
-            <a:outerShdw blurRad="40000" dist="23000" dir="5400000" rotWithShape="0">
-              <a:srgbClr val="000000">
-                <a:alpha val="35000"/>
-              </a:srgbClr>
-            </a:outerShdw>
-          </a:effectLst>
-        </a:effectStyle>
-        <a:effectStyle>
-          <a:effectLst>
-            <a:outerShdw blurRad="40000" dist="23000" dir="5400000" rotWithShape="0">
-              <a:srgbClr val="000000">
-                <a:alpha val="35000"/>
-              </a:srgbClr>
-            </a:outerShdw>
-          </a:effectLst>
-          <a:scene3d>
-            <a:camera prst="orthographicFront">
-              <a:rot lat="0" lon="0" rev="0"/>
-            </a:camera>
-            <a:lightRig rig="threePt" dir="t">
-              <a:rot lat="0" lon="0" rev="1200000"/>
-            </a:lightRig>
-          </a:scene3d>
-          <a:sp3d>
-            <a:bevelT w="63500" h="25400"/>
-          </a:sp3d>
-        </a:effectStyle>
-      </a:effectStyleLst>
-      <a:bgFillStyleLst>
-        <a:solidFill>
-          <a:schemeClr val="phClr"/>
-        </a:solidFill>
-        <a:gradFill rotWithShape="1">
-          <a:gsLst>
-            <a:gs pos="0">
-              <a:schemeClr val="phClr">
-                <a:tint val="40000"/>
-                <a:satMod val="350000"/>
-              </a:schemeClr>
-            </a:gs>
-            <a:gs pos="40000">
-              <a:schemeClr val="phClr">
-                <a:tint val="45000"/>
-                <a:shade val="99000"/>
-                <a:satMod val="350000"/>
-              </a:schemeClr>
-            </a:gs>
-            <a:gs pos="100000">
-              <a:schemeClr val="phClr">
-                <a:shade val="20000"/>
-                <a:satMod val="255000"/>
-              </a:schemeClr>
-            </a:gs>
-          </a:gsLst>
-          <a:path path="circle">
-            <a:fillToRect l="50000" t="-80000" r="50000" b="180000"/>
-          </a:path>
-        </a:gradFill>
-        <a:gradFill rotWithShape="1">
-          <a:gsLst>
-            <a:gs pos="0">
-              <a:schemeClr val="phClr">
-                <a:tint val="80000"/>
-                <a:satMod val="300000"/>
-              </a:schemeClr>
-            </a:gs>
-            <a:gs pos="100000">
-              <a:schemeClr val="phClr">
-                <a:shade val="30000"/>
-                <a:satMod val="200000"/>
-              </a:schemeClr>
-            </a:gs>
-          </a:gsLst>
-          <a:path path="circle">
-            <a:fillToRect l="50000" t="50000" r="50000" b="50000"/>
-          </a:path>
-        </a:gradFill>
-      </a:bgFillStyleLst>
-    </a:fmtScheme>
-  </a:themeElements>
-</a:theme>
 </file>
</xml_diff>